<commit_message>
Re-committed all the files till now
The files committed in the initial commit  weren't opening.
Hence had to re-commit the same files again.
</commit_message>
<xml_diff>
--- a/PBL ppt draft1.pptx
+++ b/PBL ppt draft1.pptx
@@ -14,11 +14,13 @@
     <p:sldId id="262" r:id="rId8"/>
     <p:sldId id="266" r:id="rId9"/>
     <p:sldId id="263" r:id="rId10"/>
-    <p:sldId id="264" r:id="rId11"/>
-    <p:sldId id="265" r:id="rId12"/>
-    <p:sldId id="267" r:id="rId13"/>
-    <p:sldId id="268" r:id="rId14"/>
-    <p:sldId id="269" r:id="rId15"/>
+    <p:sldId id="265" r:id="rId11"/>
+    <p:sldId id="267" r:id="rId12"/>
+    <p:sldId id="268" r:id="rId13"/>
+    <p:sldId id="269" r:id="rId14"/>
+    <p:sldId id="270" r:id="rId15"/>
+    <p:sldId id="271" r:id="rId16"/>
+    <p:sldId id="272" r:id="rId17"/>
   </p:sldIdLst>
   <p:sldSz cx="12192000" cy="6858000"/>
   <p:notesSz cx="6858000" cy="9144000"/>
@@ -125,243 +127,8 @@
 </p:presentation>
 </file>
 
-<file path=ppt/revisionInfo.xml><?xml version="1.0" encoding="utf-8"?>
-<p1510:revInfo xmlns:a="http://schemas.openxmlformats.org/drawingml/2006/main" xmlns:r="http://schemas.openxmlformats.org/officeDocument/2006/relationships" xmlns:p1510="http://schemas.microsoft.com/office/powerpoint/2015/10/main">
-  <p1510:revLst>
-    <p1510:client id="{54CF24CF-19A0-4886-A121-C215034EFFD9}" v="194" dt="2023-08-28T05:23:57.094"/>
-    <p1510:client id="{581B0A3C-4EE6-44F2-9BDE-BA2CA2C109C1}" v="332" dt="2023-08-27T20:13:34.216"/>
-    <p1510:client id="{708EAA25-19C7-49D3-9622-1D8064B3AEE1}" v="27" dt="2023-09-09T12:03:46.390"/>
-    <p1510:client id="{8DFFFF8F-B6E0-4D20-AFFA-C301FC2001C3}" v="4" dt="2023-08-27T20:16:51.631"/>
-    <p1510:client id="{9CA83DB6-08F1-45F0-85FB-25603BC3DAC4}" v="285" dt="2023-09-09T20:55:15.274"/>
-    <p1510:client id="{C09974B0-B3F3-45A1-BDB4-F834DB2BE265}" v="1" dt="2023-08-27T12:17:15.801"/>
-  </p1510:revLst>
-</p1510:revInfo>
-</file>
-
 <file path=ppt/changesInfos/changesInfo1.xml><?xml version="1.0" encoding="utf-8"?>
 <pc:chgInfo xmlns:a="http://schemas.openxmlformats.org/drawingml/2006/main" xmlns:r="http://schemas.openxmlformats.org/officeDocument/2006/relationships" xmlns:ac="http://schemas.microsoft.com/office/drawing/2013/main/command" xmlns:pc="http://schemas.microsoft.com/office/powerpoint/2013/main/command">
-  <pc:docChgLst>
-    <pc:chgData name="Guest User" providerId="Windows Live" clId="Web-{54CF24CF-19A0-4886-A121-C215034EFFD9}"/>
-    <pc:docChg chg="addSld modSld">
-      <pc:chgData name="Guest User" userId="" providerId="Windows Live" clId="Web-{54CF24CF-19A0-4886-A121-C215034EFFD9}" dt="2023-08-28T05:23:56.172" v="177" actId="20577"/>
-      <pc:docMkLst>
-        <pc:docMk/>
-      </pc:docMkLst>
-      <pc:sldChg chg="modSp">
-        <pc:chgData name="Guest User" userId="" providerId="Windows Live" clId="Web-{54CF24CF-19A0-4886-A121-C215034EFFD9}" dt="2023-08-28T05:22:45.764" v="159" actId="20577"/>
-        <pc:sldMkLst>
-          <pc:docMk/>
-          <pc:sldMk cId="1688438003" sldId="256"/>
-        </pc:sldMkLst>
-        <pc:spChg chg="mod">
-          <ac:chgData name="Guest User" userId="" providerId="Windows Live" clId="Web-{54CF24CF-19A0-4886-A121-C215034EFFD9}" dt="2023-08-28T05:22:45.764" v="159" actId="20577"/>
-          <ac:spMkLst>
-            <pc:docMk/>
-            <pc:sldMk cId="1688438003" sldId="256"/>
-            <ac:spMk id="2" creationId="{49ACDBFD-5AA0-4FED-9DFB-351660E7FA1A}"/>
-          </ac:spMkLst>
-        </pc:spChg>
-      </pc:sldChg>
-      <pc:sldChg chg="modSp">
-        <pc:chgData name="Guest User" userId="" providerId="Windows Live" clId="Web-{54CF24CF-19A0-4886-A121-C215034EFFD9}" dt="2023-08-28T05:08:16.195" v="30" actId="20577"/>
-        <pc:sldMkLst>
-          <pc:docMk/>
-          <pc:sldMk cId="1440205712" sldId="257"/>
-        </pc:sldMkLst>
-        <pc:spChg chg="mod">
-          <ac:chgData name="Guest User" userId="" providerId="Windows Live" clId="Web-{54CF24CF-19A0-4886-A121-C215034EFFD9}" dt="2023-08-28T05:08:16.195" v="30" actId="20577"/>
-          <ac:spMkLst>
-            <pc:docMk/>
-            <pc:sldMk cId="1440205712" sldId="257"/>
-            <ac:spMk id="3" creationId="{C2E29163-79E9-4765-9828-C1F2B49E0C2A}"/>
-          </ac:spMkLst>
-        </pc:spChg>
-      </pc:sldChg>
-      <pc:sldChg chg="modSp">
-        <pc:chgData name="Guest User" userId="" providerId="Windows Live" clId="Web-{54CF24CF-19A0-4886-A121-C215034EFFD9}" dt="2023-08-28T05:18:34.852" v="137" actId="20577"/>
-        <pc:sldMkLst>
-          <pc:docMk/>
-          <pc:sldMk cId="4152925078" sldId="258"/>
-        </pc:sldMkLst>
-        <pc:spChg chg="mod">
-          <ac:chgData name="Guest User" userId="" providerId="Windows Live" clId="Web-{54CF24CF-19A0-4886-A121-C215034EFFD9}" dt="2023-08-28T05:18:34.852" v="137" actId="20577"/>
-          <ac:spMkLst>
-            <pc:docMk/>
-            <pc:sldMk cId="4152925078" sldId="258"/>
-            <ac:spMk id="3" creationId="{A09F7DD5-876B-4DF7-8D30-0DBE8376D89B}"/>
-          </ac:spMkLst>
-        </pc:spChg>
-      </pc:sldChg>
-      <pc:sldChg chg="modSp">
-        <pc:chgData name="Guest User" userId="" providerId="Windows Live" clId="Web-{54CF24CF-19A0-4886-A121-C215034EFFD9}" dt="2023-08-28T05:23:56.172" v="177" actId="20577"/>
-        <pc:sldMkLst>
-          <pc:docMk/>
-          <pc:sldMk cId="361431700" sldId="259"/>
-        </pc:sldMkLst>
-        <pc:spChg chg="mod">
-          <ac:chgData name="Guest User" userId="" providerId="Windows Live" clId="Web-{54CF24CF-19A0-4886-A121-C215034EFFD9}" dt="2023-08-28T05:23:56.172" v="177" actId="20577"/>
-          <ac:spMkLst>
-            <pc:docMk/>
-            <pc:sldMk cId="361431700" sldId="259"/>
-            <ac:spMk id="2" creationId="{1CCD1133-618B-4BEF-8B48-105BBFD498F2}"/>
-          </ac:spMkLst>
-        </pc:spChg>
-        <pc:spChg chg="mod">
-          <ac:chgData name="Guest User" userId="" providerId="Windows Live" clId="Web-{54CF24CF-19A0-4886-A121-C215034EFFD9}" dt="2023-08-28T05:08:49.056" v="39" actId="20577"/>
-          <ac:spMkLst>
-            <pc:docMk/>
-            <pc:sldMk cId="361431700" sldId="259"/>
-            <ac:spMk id="3" creationId="{2D68104E-D0BD-40CC-9F37-BFEE4AD80CF6}"/>
-          </ac:spMkLst>
-        </pc:spChg>
-      </pc:sldChg>
-      <pc:sldChg chg="modSp">
-        <pc:chgData name="Guest User" userId="" providerId="Windows Live" clId="Web-{54CF24CF-19A0-4886-A121-C215034EFFD9}" dt="2023-08-28T05:08:54.431" v="40" actId="20577"/>
-        <pc:sldMkLst>
-          <pc:docMk/>
-          <pc:sldMk cId="4291216912" sldId="260"/>
-        </pc:sldMkLst>
-        <pc:spChg chg="mod">
-          <ac:chgData name="Guest User" userId="" providerId="Windows Live" clId="Web-{54CF24CF-19A0-4886-A121-C215034EFFD9}" dt="2023-08-28T05:08:54.431" v="40" actId="20577"/>
-          <ac:spMkLst>
-            <pc:docMk/>
-            <pc:sldMk cId="4291216912" sldId="260"/>
-            <ac:spMk id="3" creationId="{35B0ACE5-4930-4848-9A23-2B016F0C8E2D}"/>
-          </ac:spMkLst>
-        </pc:spChg>
-      </pc:sldChg>
-      <pc:sldChg chg="modSp">
-        <pc:chgData name="Guest User" userId="" providerId="Windows Live" clId="Web-{54CF24CF-19A0-4886-A121-C215034EFFD9}" dt="2023-08-28T05:19:35.760" v="139" actId="14100"/>
-        <pc:sldMkLst>
-          <pc:docMk/>
-          <pc:sldMk cId="2784537791" sldId="261"/>
-        </pc:sldMkLst>
-        <pc:spChg chg="mod">
-          <ac:chgData name="Guest User" userId="" providerId="Windows Live" clId="Web-{54CF24CF-19A0-4886-A121-C215034EFFD9}" dt="2023-08-28T05:19:35.760" v="139" actId="14100"/>
-          <ac:spMkLst>
-            <pc:docMk/>
-            <pc:sldMk cId="2784537791" sldId="261"/>
-            <ac:spMk id="3" creationId="{925BC252-3007-494A-A136-018AC5223F6E}"/>
-          </ac:spMkLst>
-        </pc:spChg>
-      </pc:sldChg>
-      <pc:sldChg chg="modSp">
-        <pc:chgData name="Guest User" userId="" providerId="Windows Live" clId="Web-{54CF24CF-19A0-4886-A121-C215034EFFD9}" dt="2023-08-28T05:20:07.901" v="143" actId="14100"/>
-        <pc:sldMkLst>
-          <pc:docMk/>
-          <pc:sldMk cId="185912686" sldId="262"/>
-        </pc:sldMkLst>
-        <pc:spChg chg="mod">
-          <ac:chgData name="Guest User" userId="" providerId="Windows Live" clId="Web-{54CF24CF-19A0-4886-A121-C215034EFFD9}" dt="2023-08-28T05:20:07.901" v="143" actId="14100"/>
-          <ac:spMkLst>
-            <pc:docMk/>
-            <pc:sldMk cId="185912686" sldId="262"/>
-            <ac:spMk id="3" creationId="{1A7ED7D1-5048-498B-B092-E807E58A1614}"/>
-          </ac:spMkLst>
-        </pc:spChg>
-      </pc:sldChg>
-      <pc:sldChg chg="modSp">
-        <pc:chgData name="Guest User" userId="" providerId="Windows Live" clId="Web-{54CF24CF-19A0-4886-A121-C215034EFFD9}" dt="2023-08-28T05:23:02.921" v="163" actId="20577"/>
-        <pc:sldMkLst>
-          <pc:docMk/>
-          <pc:sldMk cId="1862747852" sldId="265"/>
-        </pc:sldMkLst>
-        <pc:spChg chg="mod">
-          <ac:chgData name="Guest User" userId="" providerId="Windows Live" clId="Web-{54CF24CF-19A0-4886-A121-C215034EFFD9}" dt="2023-08-28T05:23:02.921" v="163" actId="20577"/>
-          <ac:spMkLst>
-            <pc:docMk/>
-            <pc:sldMk cId="1862747852" sldId="265"/>
-            <ac:spMk id="3" creationId="{4B6302CE-57BF-4EFB-A97B-BCDF0625C847}"/>
-          </ac:spMkLst>
-        </pc:spChg>
-      </pc:sldChg>
-      <pc:sldChg chg="delSp modSp new">
-        <pc:chgData name="Guest User" userId="" providerId="Windows Live" clId="Web-{54CF24CF-19A0-4886-A121-C215034EFFD9}" dt="2023-08-28T05:21:04.949" v="149" actId="20577"/>
-        <pc:sldMkLst>
-          <pc:docMk/>
-          <pc:sldMk cId="3327030687" sldId="266"/>
-        </pc:sldMkLst>
-        <pc:spChg chg="del">
-          <ac:chgData name="Guest User" userId="" providerId="Windows Live" clId="Web-{54CF24CF-19A0-4886-A121-C215034EFFD9}" dt="2023-08-28T05:15:42.925" v="72"/>
-          <ac:spMkLst>
-            <pc:docMk/>
-            <pc:sldMk cId="3327030687" sldId="266"/>
-            <ac:spMk id="2" creationId="{623605CD-AE1F-E98E-81BC-F5799D09DD90}"/>
-          </ac:spMkLst>
-        </pc:spChg>
-        <pc:spChg chg="mod">
-          <ac:chgData name="Guest User" userId="" providerId="Windows Live" clId="Web-{54CF24CF-19A0-4886-A121-C215034EFFD9}" dt="2023-08-28T05:21:04.949" v="149" actId="20577"/>
-          <ac:spMkLst>
-            <pc:docMk/>
-            <pc:sldMk cId="3327030687" sldId="266"/>
-            <ac:spMk id="3" creationId="{132CBB4D-7E70-148C-1AEF-FEF34007ECED}"/>
-          </ac:spMkLst>
-        </pc:spChg>
-      </pc:sldChg>
-    </pc:docChg>
-  </pc:docChgLst>
-  <pc:docChgLst>
-    <pc:chgData name="Guest User" providerId="Windows Live" clId="Web-{9CA83DB6-08F1-45F0-85FB-25603BC3DAC4}"/>
-    <pc:docChg chg="addSld modSld sldOrd">
-      <pc:chgData name="Guest User" userId="" providerId="Windows Live" clId="Web-{9CA83DB6-08F1-45F0-85FB-25603BC3DAC4}" dt="2023-09-09T20:54:51.180" v="275" actId="20577"/>
-      <pc:docMkLst>
-        <pc:docMk/>
-      </pc:docMkLst>
-      <pc:sldChg chg="modSp add ord replId">
-        <pc:chgData name="Guest User" userId="" providerId="Windows Live" clId="Web-{9CA83DB6-08F1-45F0-85FB-25603BC3DAC4}" dt="2023-09-09T20:45:43.647" v="138" actId="20577"/>
-        <pc:sldMkLst>
-          <pc:docMk/>
-          <pc:sldMk cId="1448925615" sldId="267"/>
-        </pc:sldMkLst>
-        <pc:spChg chg="mod">
-          <ac:chgData name="Guest User" userId="" providerId="Windows Live" clId="Web-{9CA83DB6-08F1-45F0-85FB-25603BC3DAC4}" dt="2023-09-09T20:42:12.921" v="112" actId="20577"/>
-          <ac:spMkLst>
-            <pc:docMk/>
-            <pc:sldMk cId="1448925615" sldId="267"/>
-            <ac:spMk id="2" creationId="{F5228CC3-E8D4-42B1-B837-121B30534E51}"/>
-          </ac:spMkLst>
-        </pc:spChg>
-        <pc:spChg chg="mod">
-          <ac:chgData name="Guest User" userId="" providerId="Windows Live" clId="Web-{9CA83DB6-08F1-45F0-85FB-25603BC3DAC4}" dt="2023-09-09T20:45:43.647" v="138" actId="20577"/>
-          <ac:spMkLst>
-            <pc:docMk/>
-            <pc:sldMk cId="1448925615" sldId="267"/>
-            <ac:spMk id="3" creationId="{925BC252-3007-494A-A136-018AC5223F6E}"/>
-          </ac:spMkLst>
-        </pc:spChg>
-      </pc:sldChg>
-      <pc:sldChg chg="modSp add ord replId">
-        <pc:chgData name="Guest User" userId="" providerId="Windows Live" clId="Web-{9CA83DB6-08F1-45F0-85FB-25603BC3DAC4}" dt="2023-09-09T20:54:51.180" v="275" actId="20577"/>
-        <pc:sldMkLst>
-          <pc:docMk/>
-          <pc:sldMk cId="2289503668" sldId="268"/>
-        </pc:sldMkLst>
-        <pc:spChg chg="mod">
-          <ac:chgData name="Guest User" userId="" providerId="Windows Live" clId="Web-{9CA83DB6-08F1-45F0-85FB-25603BC3DAC4}" dt="2023-09-09T20:54:51.180" v="275" actId="20577"/>
-          <ac:spMkLst>
-            <pc:docMk/>
-            <pc:sldMk cId="2289503668" sldId="268"/>
-            <ac:spMk id="3" creationId="{1A7ED7D1-5048-498B-B092-E807E58A1614}"/>
-          </ac:spMkLst>
-        </pc:spChg>
-      </pc:sldChg>
-      <pc:sldChg chg="modSp add replId">
-        <pc:chgData name="Guest User" userId="" providerId="Windows Live" clId="Web-{9CA83DB6-08F1-45F0-85FB-25603BC3DAC4}" dt="2023-09-09T20:38:30.086" v="76" actId="20577"/>
-        <pc:sldMkLst>
-          <pc:docMk/>
-          <pc:sldMk cId="2767332515" sldId="269"/>
-        </pc:sldMkLst>
-        <pc:spChg chg="mod">
-          <ac:chgData name="Guest User" userId="" providerId="Windows Live" clId="Web-{9CA83DB6-08F1-45F0-85FB-25603BC3DAC4}" dt="2023-09-09T20:38:30.086" v="76" actId="20577"/>
-          <ac:spMkLst>
-            <pc:docMk/>
-            <pc:sldMk cId="2767332515" sldId="269"/>
-            <ac:spMk id="3" creationId="{1A7ED7D1-5048-498B-B092-E807E58A1614}"/>
-          </ac:spMkLst>
-        </pc:spChg>
-      </pc:sldChg>
-    </pc:docChg>
-  </pc:docChgLst>
   <pc:docChgLst>
     <pc:chgData name="Guest User" providerId="Windows Live" clId="Web-{581B0A3C-4EE6-44F2-9BDE-BA2CA2C109C1}"/>
     <pc:docChg chg="modSld sldOrd">
@@ -417,59 +184,20 @@
     </pc:docChg>
   </pc:docChgLst>
   <pc:docChgLst>
-    <pc:chgData name="Raghav Nagpal" userId="3b9f696ebbd127c3" providerId="LiveId" clId="{D479DBF9-E295-7149-BDB2-3591D3AC35B3}"/>
-    <pc:docChg chg="custSel modSld">
-      <pc:chgData name="Raghav Nagpal" userId="3b9f696ebbd127c3" providerId="LiveId" clId="{D479DBF9-E295-7149-BDB2-3591D3AC35B3}" dt="2023-08-28T05:44:53.705" v="839" actId="20577"/>
+    <pc:chgData name="Shantanu Deshmukh" userId="f2c0d354abe63318" providerId="Windows Live" clId="Web-{B43A1534-69CA-491B-8E23-B0E5A0D38C21}"/>
+    <pc:docChg chg="addSld modSld">
+      <pc:chgData name="Shantanu Deshmukh" userId="f2c0d354abe63318" providerId="Windows Live" clId="Web-{B43A1534-69CA-491B-8E23-B0E5A0D38C21}" dt="2023-09-10T21:13:07.435" v="646" actId="20577"/>
       <pc:docMkLst>
         <pc:docMk/>
       </pc:docMkLst>
       <pc:sldChg chg="modSp">
-        <pc:chgData name="Raghav Nagpal" userId="3b9f696ebbd127c3" providerId="LiveId" clId="{D479DBF9-E295-7149-BDB2-3591D3AC35B3}" dt="2023-08-28T04:28:09.745" v="663" actId="20577"/>
-        <pc:sldMkLst>
-          <pc:docMk/>
-          <pc:sldMk cId="361431700" sldId="259"/>
-        </pc:sldMkLst>
-        <pc:spChg chg="mod">
-          <ac:chgData name="Raghav Nagpal" userId="3b9f696ebbd127c3" providerId="LiveId" clId="{D479DBF9-E295-7149-BDB2-3591D3AC35B3}" dt="2023-08-28T04:28:09.745" v="663" actId="20577"/>
-          <ac:spMkLst>
-            <pc:docMk/>
-            <pc:sldMk cId="361431700" sldId="259"/>
-            <ac:spMk id="3" creationId="{2D68104E-D0BD-40CC-9F37-BFEE4AD80CF6}"/>
-          </ac:spMkLst>
-        </pc:spChg>
-      </pc:sldChg>
-      <pc:sldChg chg="modSp">
-        <pc:chgData name="Raghav Nagpal" userId="3b9f696ebbd127c3" providerId="LiveId" clId="{D479DBF9-E295-7149-BDB2-3591D3AC35B3}" dt="2023-08-28T05:44:53.705" v="839" actId="20577"/>
-        <pc:sldMkLst>
-          <pc:docMk/>
-          <pc:sldMk cId="4291216912" sldId="260"/>
-        </pc:sldMkLst>
-        <pc:spChg chg="mod">
-          <ac:chgData name="Raghav Nagpal" userId="3b9f696ebbd127c3" providerId="LiveId" clId="{D479DBF9-E295-7149-BDB2-3591D3AC35B3}" dt="2023-08-28T05:44:53.705" v="839" actId="20577"/>
-          <ac:spMkLst>
-            <pc:docMk/>
-            <pc:sldMk cId="4291216912" sldId="260"/>
-            <ac:spMk id="3" creationId="{35B0ACE5-4930-4848-9A23-2B016F0C8E2D}"/>
-          </ac:spMkLst>
-        </pc:spChg>
-      </pc:sldChg>
-    </pc:docChg>
-  </pc:docChgLst>
-  <pc:docChgLst>
-    <pc:chgData name="Shantanu Deshmukh" userId="f2c0d354abe63318" providerId="Windows Live" clId="Web-{708EAA25-19C7-49D3-9622-1D8064B3AEE1}"/>
-    <pc:docChg chg="modSld">
-      <pc:chgData name="Shantanu Deshmukh" userId="f2c0d354abe63318" providerId="Windows Live" clId="Web-{708EAA25-19C7-49D3-9622-1D8064B3AEE1}" dt="2023-09-09T12:03:46.390" v="26" actId="20577"/>
-      <pc:docMkLst>
-        <pc:docMk/>
-      </pc:docMkLst>
-      <pc:sldChg chg="modSp">
-        <pc:chgData name="Shantanu Deshmukh" userId="f2c0d354abe63318" providerId="Windows Live" clId="Web-{708EAA25-19C7-49D3-9622-1D8064B3AEE1}" dt="2023-09-09T12:03:46.390" v="26" actId="20577"/>
+        <pc:chgData name="Shantanu Deshmukh" userId="f2c0d354abe63318" providerId="Windows Live" clId="Web-{B43A1534-69CA-491B-8E23-B0E5A0D38C21}" dt="2023-09-10T21:13:07.435" v="646" actId="20577"/>
         <pc:sldMkLst>
           <pc:docMk/>
           <pc:sldMk cId="347522169" sldId="263"/>
         </pc:sldMkLst>
         <pc:spChg chg="mod">
-          <ac:chgData name="Shantanu Deshmukh" userId="f2c0d354abe63318" providerId="Windows Live" clId="Web-{708EAA25-19C7-49D3-9622-1D8064B3AEE1}" dt="2023-09-09T12:03:46.390" v="26" actId="20577"/>
+          <ac:chgData name="Shantanu Deshmukh" userId="f2c0d354abe63318" providerId="Windows Live" clId="Web-{B43A1534-69CA-491B-8E23-B0E5A0D38C21}" dt="2023-09-10T21:13:07.435" v="646" actId="20577"/>
           <ac:spMkLst>
             <pc:docMk/>
             <pc:sldMk cId="347522169" sldId="263"/>
@@ -477,60 +205,65 @@
           </ac:spMkLst>
         </pc:spChg>
       </pc:sldChg>
-    </pc:docChg>
-  </pc:docChgLst>
-  <pc:docChgLst>
-    <pc:chgData name="Guest User" providerId="Windows Live" clId="Web-{8DFFFF8F-B6E0-4D20-AFFA-C301FC2001C3}"/>
-    <pc:docChg chg="modSld">
-      <pc:chgData name="Guest User" userId="" providerId="Windows Live" clId="Web-{8DFFFF8F-B6E0-4D20-AFFA-C301FC2001C3}" dt="2023-08-27T20:16:51.631" v="3" actId="20577"/>
-      <pc:docMkLst>
-        <pc:docMk/>
-      </pc:docMkLst>
-      <pc:sldChg chg="modSp">
-        <pc:chgData name="Guest User" userId="" providerId="Windows Live" clId="Web-{8DFFFF8F-B6E0-4D20-AFFA-C301FC2001C3}" dt="2023-08-27T20:16:51.631" v="3" actId="20577"/>
+      <pc:sldChg chg="modSp new">
+        <pc:chgData name="Shantanu Deshmukh" userId="f2c0d354abe63318" providerId="Windows Live" clId="Web-{B43A1534-69CA-491B-8E23-B0E5A0D38C21}" dt="2023-09-10T21:02:20.796" v="121" actId="14100"/>
         <pc:sldMkLst>
           <pc:docMk/>
-          <pc:sldMk cId="185912686" sldId="262"/>
+          <pc:sldMk cId="2779233696" sldId="270"/>
         </pc:sldMkLst>
         <pc:spChg chg="mod">
-          <ac:chgData name="Guest User" userId="" providerId="Windows Live" clId="Web-{8DFFFF8F-B6E0-4D20-AFFA-C301FC2001C3}" dt="2023-08-27T20:16:51.631" v="3" actId="20577"/>
+          <ac:chgData name="Shantanu Deshmukh" userId="f2c0d354abe63318" providerId="Windows Live" clId="Web-{B43A1534-69CA-491B-8E23-B0E5A0D38C21}" dt="2023-09-10T21:00:47.998" v="112" actId="20577"/>
           <ac:spMkLst>
             <pc:docMk/>
-            <pc:sldMk cId="185912686" sldId="262"/>
-            <ac:spMk id="3" creationId="{1A7ED7D1-5048-498B-B092-E807E58A1614}"/>
+            <pc:sldMk cId="2779233696" sldId="270"/>
+            <ac:spMk id="2" creationId="{A66A6873-B83E-7743-AF3E-CD9AFC804CCB}"/>
+          </ac:spMkLst>
+        </pc:spChg>
+        <pc:spChg chg="mod">
+          <ac:chgData name="Shantanu Deshmukh" userId="f2c0d354abe63318" providerId="Windows Live" clId="Web-{B43A1534-69CA-491B-8E23-B0E5A0D38C21}" dt="2023-09-10T21:02:20.796" v="121" actId="14100"/>
+          <ac:spMkLst>
+            <pc:docMk/>
+            <pc:sldMk cId="2779233696" sldId="270"/>
+            <ac:spMk id="3" creationId="{1A2E5346-FA6F-E3BC-6266-358CA077EB10}"/>
           </ac:spMkLst>
         </pc:spChg>
       </pc:sldChg>
-    </pc:docChg>
-  </pc:docChgLst>
-  <pc:docChgLst>
-    <pc:chgData name="Guest User" providerId="Windows Live" clId="Web-{C09974B0-B3F3-45A1-BDB4-F834DB2BE265}"/>
-    <pc:docChg chg="modSld">
-      <pc:chgData name="Guest User" userId="" providerId="Windows Live" clId="Web-{C09974B0-B3F3-45A1-BDB4-F834DB2BE265}" dt="2023-08-27T12:17:15.801" v="0" actId="20577"/>
-      <pc:docMkLst>
-        <pc:docMk/>
-      </pc:docMkLst>
-      <pc:sldChg chg="modSp">
-        <pc:chgData name="Guest User" userId="" providerId="Windows Live" clId="Web-{C09974B0-B3F3-45A1-BDB4-F834DB2BE265}" dt="2023-08-27T12:17:15.801" v="0" actId="20577"/>
+      <pc:sldChg chg="modSp new">
+        <pc:chgData name="Shantanu Deshmukh" userId="f2c0d354abe63318" providerId="Windows Live" clId="Web-{B43A1534-69CA-491B-8E23-B0E5A0D38C21}" dt="2023-09-10T20:59:31.168" v="94" actId="20577"/>
         <pc:sldMkLst>
           <pc:docMk/>
-          <pc:sldMk cId="1440205712" sldId="257"/>
+          <pc:sldMk cId="3571679" sldId="271"/>
         </pc:sldMkLst>
         <pc:spChg chg="mod">
-          <ac:chgData name="Guest User" userId="" providerId="Windows Live" clId="Web-{C09974B0-B3F3-45A1-BDB4-F834DB2BE265}" dt="2023-08-27T12:17:15.801" v="0" actId="20577"/>
+          <ac:chgData name="Shantanu Deshmukh" userId="f2c0d354abe63318" providerId="Windows Live" clId="Web-{B43A1534-69CA-491B-8E23-B0E5A0D38C21}" dt="2023-09-10T20:54:07.030" v="61" actId="14100"/>
           <ac:spMkLst>
             <pc:docMk/>
-            <pc:sldMk cId="1440205712" sldId="257"/>
-            <ac:spMk id="3" creationId="{C2E29163-79E9-4765-9828-C1F2B49E0C2A}"/>
+            <pc:sldMk cId="3571679" sldId="271"/>
+            <ac:spMk id="2" creationId="{B2CB9EC4-B9EC-B548-F6E3-CB6D8011B946}"/>
           </ac:spMkLst>
         </pc:spChg>
+        <pc:spChg chg="mod">
+          <ac:chgData name="Shantanu Deshmukh" userId="f2c0d354abe63318" providerId="Windows Live" clId="Web-{B43A1534-69CA-491B-8E23-B0E5A0D38C21}" dt="2023-09-10T20:59:31.168" v="94" actId="20577"/>
+          <ac:spMkLst>
+            <pc:docMk/>
+            <pc:sldMk cId="3571679" sldId="271"/>
+            <ac:spMk id="3" creationId="{7E6C4B12-B282-2E7A-E04A-A03510DC4CA6}"/>
+          </ac:spMkLst>
+        </pc:spChg>
+      </pc:sldChg>
+      <pc:sldChg chg="new">
+        <pc:chgData name="Shantanu Deshmukh" userId="f2c0d354abe63318" providerId="Windows Live" clId="Web-{B43A1534-69CA-491B-8E23-B0E5A0D38C21}" dt="2023-09-10T20:51:25.057" v="51"/>
+        <pc:sldMkLst>
+          <pc:docMk/>
+          <pc:sldMk cId="1876807123" sldId="272"/>
+        </pc:sldMkLst>
       </pc:sldChg>
     </pc:docChg>
   </pc:docChgLst>
   <pc:docChgLst>
     <pc:chgData name="Ayush Prasad" userId="3d6e1b8dd04a50c7" providerId="LiveId" clId="{22C48D3F-4D9E-4300-A361-D620A83703A2}"/>
     <pc:docChg chg="undo custSel addSld delSld modSld">
-      <pc:chgData name="Ayush Prasad" userId="3d6e1b8dd04a50c7" providerId="LiveId" clId="{22C48D3F-4D9E-4300-A361-D620A83703A2}" dt="2023-08-27T12:17:46.015" v="1185" actId="20577"/>
+      <pc:chgData name="Ayush Prasad" userId="3d6e1b8dd04a50c7" providerId="LiveId" clId="{22C48D3F-4D9E-4300-A361-D620A83703A2}" dt="2023-09-12T11:26:10.932" v="1186" actId="47"/>
       <pc:docMkLst>
         <pc:docMk/>
       </pc:docMkLst>
@@ -701,8 +434,8 @@
           </ac:spMkLst>
         </pc:spChg>
       </pc:sldChg>
-      <pc:sldChg chg="delSp modSp new">
-        <pc:chgData name="Ayush Prasad" userId="3d6e1b8dd04a50c7" providerId="LiveId" clId="{22C48D3F-4D9E-4300-A361-D620A83703A2}" dt="2023-08-27T12:09:04.365" v="1130" actId="14100"/>
+      <pc:sldChg chg="delSp modSp new del">
+        <pc:chgData name="Ayush Prasad" userId="3d6e1b8dd04a50c7" providerId="LiveId" clId="{22C48D3F-4D9E-4300-A361-D620A83703A2}" dt="2023-09-12T11:26:10.932" v="1186" actId="47"/>
         <pc:sldMkLst>
           <pc:docMk/>
           <pc:sldMk cId="3463460459" sldId="264"/>
@@ -756,6 +489,363 @@
       </pc:sldChg>
     </pc:docChg>
   </pc:docChgLst>
+  <pc:docChgLst>
+    <pc:chgData name="Guest User" providerId="Windows Live" clId="Web-{9CA83DB6-08F1-45F0-85FB-25603BC3DAC4}"/>
+    <pc:docChg chg="addSld modSld sldOrd">
+      <pc:chgData name="Guest User" userId="" providerId="Windows Live" clId="Web-{9CA83DB6-08F1-45F0-85FB-25603BC3DAC4}" dt="2023-09-09T20:54:51.180" v="275" actId="20577"/>
+      <pc:docMkLst>
+        <pc:docMk/>
+      </pc:docMkLst>
+      <pc:sldChg chg="modSp add ord replId">
+        <pc:chgData name="Guest User" userId="" providerId="Windows Live" clId="Web-{9CA83DB6-08F1-45F0-85FB-25603BC3DAC4}" dt="2023-09-09T20:45:43.647" v="138" actId="20577"/>
+        <pc:sldMkLst>
+          <pc:docMk/>
+          <pc:sldMk cId="1448925615" sldId="267"/>
+        </pc:sldMkLst>
+        <pc:spChg chg="mod">
+          <ac:chgData name="Guest User" userId="" providerId="Windows Live" clId="Web-{9CA83DB6-08F1-45F0-85FB-25603BC3DAC4}" dt="2023-09-09T20:42:12.921" v="112" actId="20577"/>
+          <ac:spMkLst>
+            <pc:docMk/>
+            <pc:sldMk cId="1448925615" sldId="267"/>
+            <ac:spMk id="2" creationId="{F5228CC3-E8D4-42B1-B837-121B30534E51}"/>
+          </ac:spMkLst>
+        </pc:spChg>
+        <pc:spChg chg="mod">
+          <ac:chgData name="Guest User" userId="" providerId="Windows Live" clId="Web-{9CA83DB6-08F1-45F0-85FB-25603BC3DAC4}" dt="2023-09-09T20:45:43.647" v="138" actId="20577"/>
+          <ac:spMkLst>
+            <pc:docMk/>
+            <pc:sldMk cId="1448925615" sldId="267"/>
+            <ac:spMk id="3" creationId="{925BC252-3007-494A-A136-018AC5223F6E}"/>
+          </ac:spMkLst>
+        </pc:spChg>
+      </pc:sldChg>
+      <pc:sldChg chg="modSp add ord replId">
+        <pc:chgData name="Guest User" userId="" providerId="Windows Live" clId="Web-{9CA83DB6-08F1-45F0-85FB-25603BC3DAC4}" dt="2023-09-09T20:54:51.180" v="275" actId="20577"/>
+        <pc:sldMkLst>
+          <pc:docMk/>
+          <pc:sldMk cId="2289503668" sldId="268"/>
+        </pc:sldMkLst>
+        <pc:spChg chg="mod">
+          <ac:chgData name="Guest User" userId="" providerId="Windows Live" clId="Web-{9CA83DB6-08F1-45F0-85FB-25603BC3DAC4}" dt="2023-09-09T20:54:51.180" v="275" actId="20577"/>
+          <ac:spMkLst>
+            <pc:docMk/>
+            <pc:sldMk cId="2289503668" sldId="268"/>
+            <ac:spMk id="3" creationId="{1A7ED7D1-5048-498B-B092-E807E58A1614}"/>
+          </ac:spMkLst>
+        </pc:spChg>
+      </pc:sldChg>
+      <pc:sldChg chg="modSp add replId">
+        <pc:chgData name="Guest User" userId="" providerId="Windows Live" clId="Web-{9CA83DB6-08F1-45F0-85FB-25603BC3DAC4}" dt="2023-09-09T20:38:30.086" v="76" actId="20577"/>
+        <pc:sldMkLst>
+          <pc:docMk/>
+          <pc:sldMk cId="2767332515" sldId="269"/>
+        </pc:sldMkLst>
+        <pc:spChg chg="mod">
+          <ac:chgData name="Guest User" userId="" providerId="Windows Live" clId="Web-{9CA83DB6-08F1-45F0-85FB-25603BC3DAC4}" dt="2023-09-09T20:38:30.086" v="76" actId="20577"/>
+          <ac:spMkLst>
+            <pc:docMk/>
+            <pc:sldMk cId="2767332515" sldId="269"/>
+            <ac:spMk id="3" creationId="{1A7ED7D1-5048-498B-B092-E807E58A1614}"/>
+          </ac:spMkLst>
+        </pc:spChg>
+      </pc:sldChg>
+    </pc:docChg>
+  </pc:docChgLst>
+  <pc:docChgLst>
+    <pc:chgData name="Guest User" providerId="Windows Live" clId="Web-{8DFFFF8F-B6E0-4D20-AFFA-C301FC2001C3}"/>
+    <pc:docChg chg="modSld">
+      <pc:chgData name="Guest User" userId="" providerId="Windows Live" clId="Web-{8DFFFF8F-B6E0-4D20-AFFA-C301FC2001C3}" dt="2023-08-27T20:16:51.631" v="3" actId="20577"/>
+      <pc:docMkLst>
+        <pc:docMk/>
+      </pc:docMkLst>
+      <pc:sldChg chg="modSp">
+        <pc:chgData name="Guest User" userId="" providerId="Windows Live" clId="Web-{8DFFFF8F-B6E0-4D20-AFFA-C301FC2001C3}" dt="2023-08-27T20:16:51.631" v="3" actId="20577"/>
+        <pc:sldMkLst>
+          <pc:docMk/>
+          <pc:sldMk cId="185912686" sldId="262"/>
+        </pc:sldMkLst>
+        <pc:spChg chg="mod">
+          <ac:chgData name="Guest User" userId="" providerId="Windows Live" clId="Web-{8DFFFF8F-B6E0-4D20-AFFA-C301FC2001C3}" dt="2023-08-27T20:16:51.631" v="3" actId="20577"/>
+          <ac:spMkLst>
+            <pc:docMk/>
+            <pc:sldMk cId="185912686" sldId="262"/>
+            <ac:spMk id="3" creationId="{1A7ED7D1-5048-498B-B092-E807E58A1614}"/>
+          </ac:spMkLst>
+        </pc:spChg>
+      </pc:sldChg>
+    </pc:docChg>
+  </pc:docChgLst>
+  <pc:docChgLst>
+    <pc:chgData name="Shantanu Deshmukh" userId="f2c0d354abe63318" providerId="Windows Live" clId="Web-{6817B025-AD30-4FF7-8FE2-00A36C7BB831}"/>
+    <pc:docChg chg="modSld sldOrd">
+      <pc:chgData name="Shantanu Deshmukh" userId="f2c0d354abe63318" providerId="Windows Live" clId="Web-{6817B025-AD30-4FF7-8FE2-00A36C7BB831}" dt="2023-09-10T19:34:02.893" v="1" actId="20577"/>
+      <pc:docMkLst>
+        <pc:docMk/>
+      </pc:docMkLst>
+      <pc:sldChg chg="modSp ord">
+        <pc:chgData name="Shantanu Deshmukh" userId="f2c0d354abe63318" providerId="Windows Live" clId="Web-{6817B025-AD30-4FF7-8FE2-00A36C7BB831}" dt="2023-09-10T19:34:02.893" v="1" actId="20577"/>
+        <pc:sldMkLst>
+          <pc:docMk/>
+          <pc:sldMk cId="347522169" sldId="263"/>
+        </pc:sldMkLst>
+        <pc:spChg chg="mod">
+          <ac:chgData name="Shantanu Deshmukh" userId="f2c0d354abe63318" providerId="Windows Live" clId="Web-{6817B025-AD30-4FF7-8FE2-00A36C7BB831}" dt="2023-09-10T19:34:02.893" v="1" actId="20577"/>
+          <ac:spMkLst>
+            <pc:docMk/>
+            <pc:sldMk cId="347522169" sldId="263"/>
+            <ac:spMk id="3" creationId="{A8CD7BB0-FE59-4C5E-ACFF-C2FE606834E0}"/>
+          </ac:spMkLst>
+        </pc:spChg>
+      </pc:sldChg>
+    </pc:docChg>
+  </pc:docChgLst>
+  <pc:docChgLst>
+    <pc:chgData name="Guest User" providerId="Windows Live" clId="Web-{C09974B0-B3F3-45A1-BDB4-F834DB2BE265}"/>
+    <pc:docChg chg="modSld">
+      <pc:chgData name="Guest User" userId="" providerId="Windows Live" clId="Web-{C09974B0-B3F3-45A1-BDB4-F834DB2BE265}" dt="2023-08-27T12:17:15.801" v="0" actId="20577"/>
+      <pc:docMkLst>
+        <pc:docMk/>
+      </pc:docMkLst>
+      <pc:sldChg chg="modSp">
+        <pc:chgData name="Guest User" userId="" providerId="Windows Live" clId="Web-{C09974B0-B3F3-45A1-BDB4-F834DB2BE265}" dt="2023-08-27T12:17:15.801" v="0" actId="20577"/>
+        <pc:sldMkLst>
+          <pc:docMk/>
+          <pc:sldMk cId="1440205712" sldId="257"/>
+        </pc:sldMkLst>
+        <pc:spChg chg="mod">
+          <ac:chgData name="Guest User" userId="" providerId="Windows Live" clId="Web-{C09974B0-B3F3-45A1-BDB4-F834DB2BE265}" dt="2023-08-27T12:17:15.801" v="0" actId="20577"/>
+          <ac:spMkLst>
+            <pc:docMk/>
+            <pc:sldMk cId="1440205712" sldId="257"/>
+            <ac:spMk id="3" creationId="{C2E29163-79E9-4765-9828-C1F2B49E0C2A}"/>
+          </ac:spMkLst>
+        </pc:spChg>
+      </pc:sldChg>
+    </pc:docChg>
+  </pc:docChgLst>
+  <pc:docChgLst>
+    <pc:chgData name="Guest User" providerId="Windows Live" clId="Web-{54CF24CF-19A0-4886-A121-C215034EFFD9}"/>
+    <pc:docChg chg="addSld modSld">
+      <pc:chgData name="Guest User" userId="" providerId="Windows Live" clId="Web-{54CF24CF-19A0-4886-A121-C215034EFFD9}" dt="2023-08-28T05:23:56.172" v="177" actId="20577"/>
+      <pc:docMkLst>
+        <pc:docMk/>
+      </pc:docMkLst>
+      <pc:sldChg chg="modSp">
+        <pc:chgData name="Guest User" userId="" providerId="Windows Live" clId="Web-{54CF24CF-19A0-4886-A121-C215034EFFD9}" dt="2023-08-28T05:22:45.764" v="159" actId="20577"/>
+        <pc:sldMkLst>
+          <pc:docMk/>
+          <pc:sldMk cId="1688438003" sldId="256"/>
+        </pc:sldMkLst>
+        <pc:spChg chg="mod">
+          <ac:chgData name="Guest User" userId="" providerId="Windows Live" clId="Web-{54CF24CF-19A0-4886-A121-C215034EFFD9}" dt="2023-08-28T05:22:45.764" v="159" actId="20577"/>
+          <ac:spMkLst>
+            <pc:docMk/>
+            <pc:sldMk cId="1688438003" sldId="256"/>
+            <ac:spMk id="2" creationId="{49ACDBFD-5AA0-4FED-9DFB-351660E7FA1A}"/>
+          </ac:spMkLst>
+        </pc:spChg>
+      </pc:sldChg>
+      <pc:sldChg chg="modSp">
+        <pc:chgData name="Guest User" userId="" providerId="Windows Live" clId="Web-{54CF24CF-19A0-4886-A121-C215034EFFD9}" dt="2023-08-28T05:08:16.195" v="30" actId="20577"/>
+        <pc:sldMkLst>
+          <pc:docMk/>
+          <pc:sldMk cId="1440205712" sldId="257"/>
+        </pc:sldMkLst>
+        <pc:spChg chg="mod">
+          <ac:chgData name="Guest User" userId="" providerId="Windows Live" clId="Web-{54CF24CF-19A0-4886-A121-C215034EFFD9}" dt="2023-08-28T05:08:16.195" v="30" actId="20577"/>
+          <ac:spMkLst>
+            <pc:docMk/>
+            <pc:sldMk cId="1440205712" sldId="257"/>
+            <ac:spMk id="3" creationId="{C2E29163-79E9-4765-9828-C1F2B49E0C2A}"/>
+          </ac:spMkLst>
+        </pc:spChg>
+      </pc:sldChg>
+      <pc:sldChg chg="modSp">
+        <pc:chgData name="Guest User" userId="" providerId="Windows Live" clId="Web-{54CF24CF-19A0-4886-A121-C215034EFFD9}" dt="2023-08-28T05:18:34.852" v="137" actId="20577"/>
+        <pc:sldMkLst>
+          <pc:docMk/>
+          <pc:sldMk cId="4152925078" sldId="258"/>
+        </pc:sldMkLst>
+        <pc:spChg chg="mod">
+          <ac:chgData name="Guest User" userId="" providerId="Windows Live" clId="Web-{54CF24CF-19A0-4886-A121-C215034EFFD9}" dt="2023-08-28T05:18:34.852" v="137" actId="20577"/>
+          <ac:spMkLst>
+            <pc:docMk/>
+            <pc:sldMk cId="4152925078" sldId="258"/>
+            <ac:spMk id="3" creationId="{A09F7DD5-876B-4DF7-8D30-0DBE8376D89B}"/>
+          </ac:spMkLst>
+        </pc:spChg>
+      </pc:sldChg>
+      <pc:sldChg chg="modSp">
+        <pc:chgData name="Guest User" userId="" providerId="Windows Live" clId="Web-{54CF24CF-19A0-4886-A121-C215034EFFD9}" dt="2023-08-28T05:23:56.172" v="177" actId="20577"/>
+        <pc:sldMkLst>
+          <pc:docMk/>
+          <pc:sldMk cId="361431700" sldId="259"/>
+        </pc:sldMkLst>
+        <pc:spChg chg="mod">
+          <ac:chgData name="Guest User" userId="" providerId="Windows Live" clId="Web-{54CF24CF-19A0-4886-A121-C215034EFFD9}" dt="2023-08-28T05:23:56.172" v="177" actId="20577"/>
+          <ac:spMkLst>
+            <pc:docMk/>
+            <pc:sldMk cId="361431700" sldId="259"/>
+            <ac:spMk id="2" creationId="{1CCD1133-618B-4BEF-8B48-105BBFD498F2}"/>
+          </ac:spMkLst>
+        </pc:spChg>
+        <pc:spChg chg="mod">
+          <ac:chgData name="Guest User" userId="" providerId="Windows Live" clId="Web-{54CF24CF-19A0-4886-A121-C215034EFFD9}" dt="2023-08-28T05:08:49.056" v="39" actId="20577"/>
+          <ac:spMkLst>
+            <pc:docMk/>
+            <pc:sldMk cId="361431700" sldId="259"/>
+            <ac:spMk id="3" creationId="{2D68104E-D0BD-40CC-9F37-BFEE4AD80CF6}"/>
+          </ac:spMkLst>
+        </pc:spChg>
+      </pc:sldChg>
+      <pc:sldChg chg="modSp">
+        <pc:chgData name="Guest User" userId="" providerId="Windows Live" clId="Web-{54CF24CF-19A0-4886-A121-C215034EFFD9}" dt="2023-08-28T05:08:54.431" v="40" actId="20577"/>
+        <pc:sldMkLst>
+          <pc:docMk/>
+          <pc:sldMk cId="4291216912" sldId="260"/>
+        </pc:sldMkLst>
+        <pc:spChg chg="mod">
+          <ac:chgData name="Guest User" userId="" providerId="Windows Live" clId="Web-{54CF24CF-19A0-4886-A121-C215034EFFD9}" dt="2023-08-28T05:08:54.431" v="40" actId="20577"/>
+          <ac:spMkLst>
+            <pc:docMk/>
+            <pc:sldMk cId="4291216912" sldId="260"/>
+            <ac:spMk id="3" creationId="{35B0ACE5-4930-4848-9A23-2B016F0C8E2D}"/>
+          </ac:spMkLst>
+        </pc:spChg>
+      </pc:sldChg>
+      <pc:sldChg chg="modSp">
+        <pc:chgData name="Guest User" userId="" providerId="Windows Live" clId="Web-{54CF24CF-19A0-4886-A121-C215034EFFD9}" dt="2023-08-28T05:19:35.760" v="139" actId="14100"/>
+        <pc:sldMkLst>
+          <pc:docMk/>
+          <pc:sldMk cId="2784537791" sldId="261"/>
+        </pc:sldMkLst>
+        <pc:spChg chg="mod">
+          <ac:chgData name="Guest User" userId="" providerId="Windows Live" clId="Web-{54CF24CF-19A0-4886-A121-C215034EFFD9}" dt="2023-08-28T05:19:35.760" v="139" actId="14100"/>
+          <ac:spMkLst>
+            <pc:docMk/>
+            <pc:sldMk cId="2784537791" sldId="261"/>
+            <ac:spMk id="3" creationId="{925BC252-3007-494A-A136-018AC5223F6E}"/>
+          </ac:spMkLst>
+        </pc:spChg>
+      </pc:sldChg>
+      <pc:sldChg chg="modSp">
+        <pc:chgData name="Guest User" userId="" providerId="Windows Live" clId="Web-{54CF24CF-19A0-4886-A121-C215034EFFD9}" dt="2023-08-28T05:20:07.901" v="143" actId="14100"/>
+        <pc:sldMkLst>
+          <pc:docMk/>
+          <pc:sldMk cId="185912686" sldId="262"/>
+        </pc:sldMkLst>
+        <pc:spChg chg="mod">
+          <ac:chgData name="Guest User" userId="" providerId="Windows Live" clId="Web-{54CF24CF-19A0-4886-A121-C215034EFFD9}" dt="2023-08-28T05:20:07.901" v="143" actId="14100"/>
+          <ac:spMkLst>
+            <pc:docMk/>
+            <pc:sldMk cId="185912686" sldId="262"/>
+            <ac:spMk id="3" creationId="{1A7ED7D1-5048-498B-B092-E807E58A1614}"/>
+          </ac:spMkLst>
+        </pc:spChg>
+      </pc:sldChg>
+      <pc:sldChg chg="modSp">
+        <pc:chgData name="Guest User" userId="" providerId="Windows Live" clId="Web-{54CF24CF-19A0-4886-A121-C215034EFFD9}" dt="2023-08-28T05:23:02.921" v="163" actId="20577"/>
+        <pc:sldMkLst>
+          <pc:docMk/>
+          <pc:sldMk cId="1862747852" sldId="265"/>
+        </pc:sldMkLst>
+        <pc:spChg chg="mod">
+          <ac:chgData name="Guest User" userId="" providerId="Windows Live" clId="Web-{54CF24CF-19A0-4886-A121-C215034EFFD9}" dt="2023-08-28T05:23:02.921" v="163" actId="20577"/>
+          <ac:spMkLst>
+            <pc:docMk/>
+            <pc:sldMk cId="1862747852" sldId="265"/>
+            <ac:spMk id="3" creationId="{4B6302CE-57BF-4EFB-A97B-BCDF0625C847}"/>
+          </ac:spMkLst>
+        </pc:spChg>
+      </pc:sldChg>
+      <pc:sldChg chg="delSp modSp new">
+        <pc:chgData name="Guest User" userId="" providerId="Windows Live" clId="Web-{54CF24CF-19A0-4886-A121-C215034EFFD9}" dt="2023-08-28T05:21:04.949" v="149" actId="20577"/>
+        <pc:sldMkLst>
+          <pc:docMk/>
+          <pc:sldMk cId="3327030687" sldId="266"/>
+        </pc:sldMkLst>
+        <pc:spChg chg="del">
+          <ac:chgData name="Guest User" userId="" providerId="Windows Live" clId="Web-{54CF24CF-19A0-4886-A121-C215034EFFD9}" dt="2023-08-28T05:15:42.925" v="72"/>
+          <ac:spMkLst>
+            <pc:docMk/>
+            <pc:sldMk cId="3327030687" sldId="266"/>
+            <ac:spMk id="2" creationId="{623605CD-AE1F-E98E-81BC-F5799D09DD90}"/>
+          </ac:spMkLst>
+        </pc:spChg>
+        <pc:spChg chg="mod">
+          <ac:chgData name="Guest User" userId="" providerId="Windows Live" clId="Web-{54CF24CF-19A0-4886-A121-C215034EFFD9}" dt="2023-08-28T05:21:04.949" v="149" actId="20577"/>
+          <ac:spMkLst>
+            <pc:docMk/>
+            <pc:sldMk cId="3327030687" sldId="266"/>
+            <ac:spMk id="3" creationId="{132CBB4D-7E70-148C-1AEF-FEF34007ECED}"/>
+          </ac:spMkLst>
+        </pc:spChg>
+      </pc:sldChg>
+    </pc:docChg>
+  </pc:docChgLst>
+  <pc:docChgLst>
+    <pc:chgData name="Raghav Nagpal" userId="3b9f696ebbd127c3" providerId="LiveId" clId="{D479DBF9-E295-7149-BDB2-3591D3AC35B3}"/>
+    <pc:docChg chg="custSel modSld">
+      <pc:chgData name="Raghav Nagpal" userId="3b9f696ebbd127c3" providerId="LiveId" clId="{D479DBF9-E295-7149-BDB2-3591D3AC35B3}" dt="2023-08-28T05:44:53.705" v="839" actId="20577"/>
+      <pc:docMkLst>
+        <pc:docMk/>
+      </pc:docMkLst>
+      <pc:sldChg chg="modSp">
+        <pc:chgData name="Raghav Nagpal" userId="3b9f696ebbd127c3" providerId="LiveId" clId="{D479DBF9-E295-7149-BDB2-3591D3AC35B3}" dt="2023-08-28T04:28:09.745" v="663" actId="20577"/>
+        <pc:sldMkLst>
+          <pc:docMk/>
+          <pc:sldMk cId="361431700" sldId="259"/>
+        </pc:sldMkLst>
+        <pc:spChg chg="mod">
+          <ac:chgData name="Raghav Nagpal" userId="3b9f696ebbd127c3" providerId="LiveId" clId="{D479DBF9-E295-7149-BDB2-3591D3AC35B3}" dt="2023-08-28T04:28:09.745" v="663" actId="20577"/>
+          <ac:spMkLst>
+            <pc:docMk/>
+            <pc:sldMk cId="361431700" sldId="259"/>
+            <ac:spMk id="3" creationId="{2D68104E-D0BD-40CC-9F37-BFEE4AD80CF6}"/>
+          </ac:spMkLst>
+        </pc:spChg>
+      </pc:sldChg>
+      <pc:sldChg chg="modSp">
+        <pc:chgData name="Raghav Nagpal" userId="3b9f696ebbd127c3" providerId="LiveId" clId="{D479DBF9-E295-7149-BDB2-3591D3AC35B3}" dt="2023-08-28T05:44:53.705" v="839" actId="20577"/>
+        <pc:sldMkLst>
+          <pc:docMk/>
+          <pc:sldMk cId="4291216912" sldId="260"/>
+        </pc:sldMkLst>
+        <pc:spChg chg="mod">
+          <ac:chgData name="Raghav Nagpal" userId="3b9f696ebbd127c3" providerId="LiveId" clId="{D479DBF9-E295-7149-BDB2-3591D3AC35B3}" dt="2023-08-28T05:44:53.705" v="839" actId="20577"/>
+          <ac:spMkLst>
+            <pc:docMk/>
+            <pc:sldMk cId="4291216912" sldId="260"/>
+            <ac:spMk id="3" creationId="{35B0ACE5-4930-4848-9A23-2B016F0C8E2D}"/>
+          </ac:spMkLst>
+        </pc:spChg>
+      </pc:sldChg>
+    </pc:docChg>
+  </pc:docChgLst>
+  <pc:docChgLst>
+    <pc:chgData name="Shantanu Deshmukh" userId="f2c0d354abe63318" providerId="Windows Live" clId="Web-{708EAA25-19C7-49D3-9622-1D8064B3AEE1}"/>
+    <pc:docChg chg="modSld">
+      <pc:chgData name="Shantanu Deshmukh" userId="f2c0d354abe63318" providerId="Windows Live" clId="Web-{708EAA25-19C7-49D3-9622-1D8064B3AEE1}" dt="2023-09-09T12:03:46.390" v="26" actId="20577"/>
+      <pc:docMkLst>
+        <pc:docMk/>
+      </pc:docMkLst>
+      <pc:sldChg chg="modSp">
+        <pc:chgData name="Shantanu Deshmukh" userId="f2c0d354abe63318" providerId="Windows Live" clId="Web-{708EAA25-19C7-49D3-9622-1D8064B3AEE1}" dt="2023-09-09T12:03:46.390" v="26" actId="20577"/>
+        <pc:sldMkLst>
+          <pc:docMk/>
+          <pc:sldMk cId="347522169" sldId="263"/>
+        </pc:sldMkLst>
+        <pc:spChg chg="mod">
+          <ac:chgData name="Shantanu Deshmukh" userId="f2c0d354abe63318" providerId="Windows Live" clId="Web-{708EAA25-19C7-49D3-9622-1D8064B3AEE1}" dt="2023-09-09T12:03:46.390" v="26" actId="20577"/>
+          <ac:spMkLst>
+            <pc:docMk/>
+            <pc:sldMk cId="347522169" sldId="263"/>
+            <ac:spMk id="3" creationId="{A8CD7BB0-FE59-4C5E-ACFF-C2FE606834E0}"/>
+          </ac:spMkLst>
+        </pc:spChg>
+      </pc:sldChg>
+    </pc:docChg>
+  </pc:docChgLst>
 </pc:chgInfo>
 </file>
 
@@ -908,7 +998,7 @@
           <a:p>
             <a:fld id="{B40BFAB7-683C-4D93-86F8-115677CBF82B}" type="datetimeFigureOut">
               <a:rPr lang="en-IN" smtClean="0"/>
-              <a:t>09-09-2023</a:t>
+              <a:t>12-09-2023</a:t>
             </a:fld>
             <a:endParaRPr lang="en-IN"/>
           </a:p>
@@ -1108,7 +1198,7 @@
           <a:p>
             <a:fld id="{B40BFAB7-683C-4D93-86F8-115677CBF82B}" type="datetimeFigureOut">
               <a:rPr lang="en-IN" smtClean="0"/>
-              <a:t>09-09-2023</a:t>
+              <a:t>12-09-2023</a:t>
             </a:fld>
             <a:endParaRPr lang="en-IN"/>
           </a:p>
@@ -1318,7 +1408,7 @@
           <a:p>
             <a:fld id="{B40BFAB7-683C-4D93-86F8-115677CBF82B}" type="datetimeFigureOut">
               <a:rPr lang="en-IN" smtClean="0"/>
-              <a:t>09-09-2023</a:t>
+              <a:t>12-09-2023</a:t>
             </a:fld>
             <a:endParaRPr lang="en-IN"/>
           </a:p>
@@ -1518,7 +1608,7 @@
           <a:p>
             <a:fld id="{B40BFAB7-683C-4D93-86F8-115677CBF82B}" type="datetimeFigureOut">
               <a:rPr lang="en-IN" smtClean="0"/>
-              <a:t>09-09-2023</a:t>
+              <a:t>12-09-2023</a:t>
             </a:fld>
             <a:endParaRPr lang="en-IN"/>
           </a:p>
@@ -1794,7 +1884,7 @@
           <a:p>
             <a:fld id="{B40BFAB7-683C-4D93-86F8-115677CBF82B}" type="datetimeFigureOut">
               <a:rPr lang="en-IN" smtClean="0"/>
-              <a:t>09-09-2023</a:t>
+              <a:t>12-09-2023</a:t>
             </a:fld>
             <a:endParaRPr lang="en-IN"/>
           </a:p>
@@ -2062,7 +2152,7 @@
           <a:p>
             <a:fld id="{B40BFAB7-683C-4D93-86F8-115677CBF82B}" type="datetimeFigureOut">
               <a:rPr lang="en-IN" smtClean="0"/>
-              <a:t>09-09-2023</a:t>
+              <a:t>12-09-2023</a:t>
             </a:fld>
             <a:endParaRPr lang="en-IN"/>
           </a:p>
@@ -2477,7 +2567,7 @@
           <a:p>
             <a:fld id="{B40BFAB7-683C-4D93-86F8-115677CBF82B}" type="datetimeFigureOut">
               <a:rPr lang="en-IN" smtClean="0"/>
-              <a:t>09-09-2023</a:t>
+              <a:t>12-09-2023</a:t>
             </a:fld>
             <a:endParaRPr lang="en-IN"/>
           </a:p>
@@ -2619,7 +2709,7 @@
           <a:p>
             <a:fld id="{B40BFAB7-683C-4D93-86F8-115677CBF82B}" type="datetimeFigureOut">
               <a:rPr lang="en-IN" smtClean="0"/>
-              <a:t>09-09-2023</a:t>
+              <a:t>12-09-2023</a:t>
             </a:fld>
             <a:endParaRPr lang="en-IN"/>
           </a:p>
@@ -2732,7 +2822,7 @@
           <a:p>
             <a:fld id="{B40BFAB7-683C-4D93-86F8-115677CBF82B}" type="datetimeFigureOut">
               <a:rPr lang="en-IN" smtClean="0"/>
-              <a:t>09-09-2023</a:t>
+              <a:t>12-09-2023</a:t>
             </a:fld>
             <a:endParaRPr lang="en-IN"/>
           </a:p>
@@ -3045,7 +3135,7 @@
           <a:p>
             <a:fld id="{B40BFAB7-683C-4D93-86F8-115677CBF82B}" type="datetimeFigureOut">
               <a:rPr lang="en-IN" smtClean="0"/>
-              <a:t>09-09-2023</a:t>
+              <a:t>12-09-2023</a:t>
             </a:fld>
             <a:endParaRPr lang="en-IN"/>
           </a:p>
@@ -3334,7 +3424,7 @@
           <a:p>
             <a:fld id="{B40BFAB7-683C-4D93-86F8-115677CBF82B}" type="datetimeFigureOut">
               <a:rPr lang="en-IN" smtClean="0"/>
-              <a:t>09-09-2023</a:t>
+              <a:t>12-09-2023</a:t>
             </a:fld>
             <a:endParaRPr lang="en-IN"/>
           </a:p>
@@ -3577,7 +3667,7 @@
           <a:p>
             <a:fld id="{B40BFAB7-683C-4D93-86F8-115677CBF82B}" type="datetimeFigureOut">
               <a:rPr lang="en-IN" smtClean="0"/>
-              <a:t>09-09-2023</a:t>
+              <a:t>12-09-2023</a:t>
             </a:fld>
             <a:endParaRPr lang="en-IN"/>
           </a:p>
@@ -4188,7 +4278,7 @@
           <p:cNvPr id="3" name="Content Placeholder 2">
             <a:extLst>
               <a:ext uri="{FF2B5EF4-FFF2-40B4-BE49-F238E27FC236}">
-                <a16:creationId xmlns:a16="http://schemas.microsoft.com/office/drawing/2014/main" id="{3A26F6FD-3838-457F-B0ED-9DEFEE248AF9}"/>
+                <a16:creationId xmlns:a16="http://schemas.microsoft.com/office/drawing/2014/main" id="{4B6302CE-57BF-4EFB-A97B-BCDF0625C847}"/>
               </a:ext>
             </a:extLst>
           </p:cNvPr>
@@ -4201,22 +4291,97 @@
         </p:nvSpPr>
         <p:spPr>
           <a:xfrm>
-            <a:off x="838200" y="708917"/>
-            <a:ext cx="10515600" cy="5468046"/>
+            <a:off x="838200" y="431515"/>
+            <a:ext cx="10515600" cy="5745448"/>
           </a:xfrm>
         </p:spPr>
         <p:txBody>
           <a:bodyPr/>
           <a:lstStyle/>
           <a:p>
-            <a:endParaRPr lang="en-IN"/>
+            <a:pPr marL="0" indent="0">
+              <a:buNone/>
+            </a:pPr>
+            <a:endParaRPr lang="en-US">
+              <a:solidFill>
+                <a:schemeClr val="tx1">
+                  <a:lumMod val="65000"/>
+                  <a:lumOff val="35000"/>
+                </a:schemeClr>
+              </a:solidFill>
+            </a:endParaRPr>
+          </a:p>
+          <a:p>
+            <a:pPr marL="0" indent="0">
+              <a:buNone/>
+            </a:pPr>
+            <a:endParaRPr lang="en-US">
+              <a:solidFill>
+                <a:schemeClr val="tx1">
+                  <a:lumMod val="65000"/>
+                  <a:lumOff val="35000"/>
+                </a:schemeClr>
+              </a:solidFill>
+            </a:endParaRPr>
+          </a:p>
+          <a:p>
+            <a:pPr marL="0" indent="0">
+              <a:buNone/>
+            </a:pPr>
+            <a:endParaRPr lang="en-US">
+              <a:solidFill>
+                <a:schemeClr val="tx1">
+                  <a:lumMod val="65000"/>
+                  <a:lumOff val="35000"/>
+                </a:schemeClr>
+              </a:solidFill>
+            </a:endParaRPr>
+          </a:p>
+          <a:p>
+            <a:pPr marL="0" indent="0">
+              <a:buNone/>
+            </a:pPr>
+            <a:endParaRPr lang="en-US">
+              <a:solidFill>
+                <a:schemeClr val="tx1">
+                  <a:lumMod val="65000"/>
+                  <a:lumOff val="35000"/>
+                </a:schemeClr>
+              </a:solidFill>
+            </a:endParaRPr>
+          </a:p>
+          <a:p>
+            <a:pPr marL="0" indent="0" algn="ctr">
+              <a:buNone/>
+            </a:pPr>
+            <a:r>
+              <a:rPr lang="en-US" sz="9600">
+                <a:solidFill>
+                  <a:schemeClr val="tx1">
+                    <a:lumMod val="65000"/>
+                    <a:lumOff val="35000"/>
+                  </a:schemeClr>
+                </a:solidFill>
+                <a:latin typeface="Century Gothic" panose="020B0502020202020204" pitchFamily="34" charset="0"/>
+              </a:rPr>
+              <a:t>Thank You</a:t>
+            </a:r>
+            <a:endParaRPr lang="en-IN" sz="9600">
+              <a:solidFill>
+                <a:schemeClr val="tx1">
+                  <a:lumMod val="65000"/>
+                  <a:lumOff val="35000"/>
+                </a:schemeClr>
+              </a:solidFill>
+              <a:latin typeface="Century Gothic" panose="020B0502020202020204" pitchFamily="34" charset="0"/>
+            </a:endParaRPr>
           </a:p>
         </p:txBody>
       </p:sp>
     </p:spTree>
     <p:extLst>
       <p:ext uri="{BB962C8B-B14F-4D97-AF65-F5344CB8AC3E}">
-        <p14:creationId xmlns:p14="http://schemas.microsoft.com/office/powerpoint/2010/main" val="3463460459"/>
+        <p14:creationId xmlns:p14="http://schemas.microsoft.com/office/powerpoint/2010/main" val="1862747852"/>
       </p:ext>
     </p:extLst>
   </p:cSld>
@@ -4245,105 +4410,368 @@
       </p:grpSpPr>
       <p:sp>
         <p:nvSpPr>
-          <p:cNvPr id="3" name="Content Placeholder 2">
-            <a:extLst>
-              <a:ext uri="{FF2B5EF4-FFF2-40B4-BE49-F238E27FC236}">
-                <a16:creationId xmlns:a16="http://schemas.microsoft.com/office/drawing/2014/main" id="{4B6302CE-57BF-4EFB-A97B-BCDF0625C847}"/>
-              </a:ext>
-            </a:extLst>
-          </p:cNvPr>
-          <p:cNvSpPr>
-            <a:spLocks noGrp="1"/>
-          </p:cNvSpPr>
-          <p:nvPr>
-            <p:ph idx="1"/>
+          <p:cNvPr id="2" name="Title 1">
+            <a:extLst>
+              <a:ext uri="{FF2B5EF4-FFF2-40B4-BE49-F238E27FC236}">
+                <a16:creationId xmlns:a16="http://schemas.microsoft.com/office/drawing/2014/main" id="{F5228CC3-E8D4-42B1-B837-121B30534E51}"/>
+              </a:ext>
+            </a:extLst>
+          </p:cNvPr>
+          <p:cNvSpPr>
+            <a:spLocks noGrp="1"/>
+          </p:cNvSpPr>
+          <p:nvPr>
+            <p:ph type="title"/>
           </p:nvPr>
         </p:nvSpPr>
         <p:spPr>
           <a:xfrm>
-            <a:off x="838200" y="431515"/>
-            <a:ext cx="10515600" cy="5745448"/>
+            <a:off x="-9659" y="224"/>
+            <a:ext cx="12264980" cy="327454"/>
           </a:xfrm>
         </p:spPr>
         <p:txBody>
-          <a:bodyPr/>
+          <a:bodyPr>
+            <a:normAutofit fontScale="90000"/>
+          </a:bodyPr>
           <a:lstStyle/>
           <a:p>
+            <a:pPr algn="ctr"/>
+            <a:br>
+              <a:rPr lang="en-US" sz="3000">
+                <a:latin typeface="BankGothic Lt BT"/>
+              </a:rPr>
+            </a:br>
+            <a:r>
+              <a:rPr lang="en-US" sz="3500">
+                <a:latin typeface="BankGothic Lt BT"/>
+              </a:rPr>
+              <a:t>home module</a:t>
+            </a:r>
+            <a:br>
+              <a:rPr lang="en-US" sz="3500">
+                <a:latin typeface="BankGothic Lt BT" panose="020B0607020203060204" pitchFamily="34" charset="0"/>
+              </a:rPr>
+            </a:br>
+            <a:r>
+              <a:rPr lang="en-US" sz="3000">
+                <a:latin typeface="BankGothic Lt BT"/>
+              </a:rPr>
+              <a:t>									     ~Aditya</a:t>
+            </a:r>
+            <a:endParaRPr lang="en-IN" sz="3000">
+              <a:latin typeface="BankGothic Lt BT"/>
+            </a:endParaRPr>
+          </a:p>
+        </p:txBody>
+      </p:sp>
+      <p:sp>
+        <p:nvSpPr>
+          <p:cNvPr id="3" name="Content Placeholder 2">
+            <a:extLst>
+              <a:ext uri="{FF2B5EF4-FFF2-40B4-BE49-F238E27FC236}">
+                <a16:creationId xmlns:a16="http://schemas.microsoft.com/office/drawing/2014/main" id="{925BC252-3007-494A-A136-018AC5223F6E}"/>
+              </a:ext>
+            </a:extLst>
+          </p:cNvPr>
+          <p:cNvSpPr>
+            <a:spLocks noGrp="1"/>
+          </p:cNvSpPr>
+          <p:nvPr>
+            <p:ph idx="1"/>
+          </p:nvPr>
+        </p:nvSpPr>
+        <p:spPr>
+          <a:xfrm>
+            <a:off x="-3773" y="732480"/>
+            <a:ext cx="12197989" cy="6120623"/>
+          </a:xfrm>
+        </p:spPr>
+        <p:txBody>
+          <a:bodyPr vert="horz" lIns="91440" tIns="45720" rIns="91440" bIns="45720" rtlCol="0" anchor="t">
+            <a:noAutofit/>
+          </a:bodyPr>
+          <a:lstStyle/>
+          <a:p>
+            <a:r>
+              <a:rPr lang="en-IN" sz="2500">
+                <a:latin typeface="calibri light"/>
+                <a:cs typeface="Calibri"/>
+              </a:rPr>
+              <a:t>The "Home" module for our website "</a:t>
+            </a:r>
+            <a:r>
+              <a:rPr lang="en-IN" sz="2500" err="1">
+                <a:latin typeface="calibri light"/>
+                <a:cs typeface="Calibri"/>
+              </a:rPr>
+              <a:t>RoomR</a:t>
+            </a:r>
+            <a:r>
+              <a:rPr lang="en-IN" sz="2500">
+                <a:latin typeface="calibri light"/>
+                <a:cs typeface="Calibri"/>
+              </a:rPr>
+              <a:t>" serves as the landing page and provides a clear and engaging introduction to the platform's purpose and features. Here's a breakdown of what we'll include in this module:</a:t>
+            </a:r>
+            <a:endParaRPr lang="en-US" sz="2500">
+              <a:latin typeface="calibri light"/>
+              <a:ea typeface="calibri light"/>
+              <a:cs typeface="Calibri"/>
+            </a:endParaRPr>
+          </a:p>
+          <a:p>
+            <a:pPr marL="342900" indent="-342900">
+              <a:buFont typeface="Wingdings"/>
+              <a:buChar char="v"/>
+            </a:pPr>
+            <a:r>
+              <a:rPr lang="en-IN" sz="2400" b="1" u="sng">
+                <a:ea typeface="+mn-lt"/>
+                <a:cs typeface="+mn-lt"/>
+              </a:rPr>
+              <a:t>Demand Analysis</a:t>
+            </a:r>
+            <a:r>
+              <a:rPr lang="en-IN" sz="2400" b="1">
+                <a:ea typeface="+mn-lt"/>
+                <a:cs typeface="+mn-lt"/>
+              </a:rPr>
+              <a:t>:</a:t>
+            </a:r>
+            <a:endParaRPr lang="en-IN" sz="2400">
+              <a:ea typeface="Calibri"/>
+              <a:cs typeface="Calibri"/>
+            </a:endParaRPr>
+          </a:p>
+          <a:p>
+            <a:pPr marL="971550" lvl="1" indent="-285750">
+              <a:buFont typeface="Arial"/>
+              <a:buChar char="•"/>
+            </a:pPr>
+            <a:r>
+              <a:rPr lang="en-IN" sz="2100" b="1" u="sng">
+                <a:ea typeface="+mn-lt"/>
+                <a:cs typeface="+mn-lt"/>
+              </a:rPr>
+              <a:t>Market Research</a:t>
+            </a:r>
+            <a:r>
+              <a:rPr lang="en-IN" sz="2100" b="1">
+                <a:ea typeface="+mn-lt"/>
+                <a:cs typeface="+mn-lt"/>
+              </a:rPr>
+              <a:t>:</a:t>
+            </a:r>
+            <a:r>
+              <a:rPr lang="en-IN" sz="2100">
+                <a:ea typeface="+mn-lt"/>
+                <a:cs typeface="+mn-lt"/>
+              </a:rPr>
+              <a:t> Conduct a market research to understand the demand for roommate finding services in your target region. Analyse demographics, housing trends, and the need for such a platform.</a:t>
+            </a:r>
+            <a:endParaRPr lang="en-IN" sz="2100">
+              <a:ea typeface="Calibri"/>
+              <a:cs typeface="Calibri"/>
+            </a:endParaRPr>
+          </a:p>
+          <a:p>
+            <a:pPr marL="971550" lvl="1" indent="-285750">
+              <a:buFont typeface="Arial"/>
+              <a:buChar char="•"/>
+            </a:pPr>
+            <a:r>
+              <a:rPr lang="en-IN" sz="2100" b="1" u="sng">
+                <a:ea typeface="+mn-lt"/>
+                <a:cs typeface="+mn-lt"/>
+              </a:rPr>
+              <a:t>User Needs</a:t>
+            </a:r>
+            <a:r>
+              <a:rPr lang="en-IN" sz="2100" b="1">
+                <a:ea typeface="+mn-lt"/>
+                <a:cs typeface="+mn-lt"/>
+              </a:rPr>
+              <a:t>:</a:t>
+            </a:r>
+            <a:r>
+              <a:rPr lang="en-IN" sz="2100">
+                <a:ea typeface="+mn-lt"/>
+                <a:cs typeface="+mn-lt"/>
+              </a:rPr>
+              <a:t> Identify user needs and pain points related to finding roommates. Consider conducting surveys or user interviews to gather insights.</a:t>
+            </a:r>
+            <a:endParaRPr lang="en-IN" sz="2100">
+              <a:ea typeface="Calibri"/>
+              <a:cs typeface="Calibri"/>
+            </a:endParaRPr>
+          </a:p>
+          <a:p>
+            <a:pPr marL="971550" lvl="1" indent="-285750">
+              <a:buFont typeface="Arial"/>
+              <a:buChar char="•"/>
+            </a:pPr>
+            <a:r>
+              <a:rPr lang="en-IN" sz="2100" b="1" u="sng">
+                <a:ea typeface="+mn-lt"/>
+                <a:cs typeface="+mn-lt"/>
+              </a:rPr>
+              <a:t>Competitive Landscape</a:t>
+            </a:r>
+            <a:r>
+              <a:rPr lang="en-IN" sz="2100" b="1">
+                <a:ea typeface="+mn-lt"/>
+                <a:cs typeface="+mn-lt"/>
+              </a:rPr>
+              <a:t>:</a:t>
+            </a:r>
+            <a:r>
+              <a:rPr lang="en-IN" sz="2100">
+                <a:ea typeface="+mn-lt"/>
+                <a:cs typeface="+mn-lt"/>
+              </a:rPr>
+              <a:t> Analyse competitors in the roommate finding space to understand their strengths and weaknesses.</a:t>
+            </a:r>
+            <a:endParaRPr lang="en-IN" sz="2100">
+              <a:ea typeface="Calibri"/>
+              <a:cs typeface="Calibri"/>
+            </a:endParaRPr>
+          </a:p>
+          <a:p>
+            <a:pPr marL="342900" indent="-342900">
+              <a:buFont typeface="Wingdings"/>
+              <a:buChar char="v"/>
+            </a:pPr>
+            <a:r>
+              <a:rPr lang="en-IN" sz="2400" b="1" u="sng">
+                <a:ea typeface="+mn-lt"/>
+                <a:cs typeface="+mn-lt"/>
+              </a:rPr>
+              <a:t>Feasibility Analysis</a:t>
+            </a:r>
+            <a:r>
+              <a:rPr lang="en-IN" sz="2400" b="1">
+                <a:ea typeface="+mn-lt"/>
+                <a:cs typeface="+mn-lt"/>
+              </a:rPr>
+              <a:t>:</a:t>
+            </a:r>
+            <a:endParaRPr lang="en-IN" sz="2400">
+              <a:ea typeface="Calibri"/>
+              <a:cs typeface="Calibri"/>
+            </a:endParaRPr>
+          </a:p>
+          <a:p>
+            <a:pPr marL="971550" lvl="1" indent="-285750">
+              <a:buFont typeface="Arial"/>
+              <a:buChar char="•"/>
+            </a:pPr>
+            <a:r>
+              <a:rPr lang="en-IN" sz="2200" b="1" u="sng">
+                <a:ea typeface="+mn-lt"/>
+                <a:cs typeface="+mn-lt"/>
+              </a:rPr>
+              <a:t>Legal and Regulatory</a:t>
+            </a:r>
+            <a:r>
+              <a:rPr lang="en-IN" sz="2200" b="1">
+                <a:ea typeface="+mn-lt"/>
+                <a:cs typeface="+mn-lt"/>
+              </a:rPr>
+              <a:t>:</a:t>
+            </a:r>
+            <a:r>
+              <a:rPr lang="en-IN" sz="2200">
+                <a:ea typeface="+mn-lt"/>
+                <a:cs typeface="+mn-lt"/>
+              </a:rPr>
+              <a:t> Assess the legal and regulatory requirements for operating a roommate finder website, including data privacy laws, user agreements, and intellectual property rights.</a:t>
+            </a:r>
+            <a:endParaRPr lang="en-IN" sz="2200">
+              <a:ea typeface="Calibri"/>
+              <a:cs typeface="Calibri"/>
+            </a:endParaRPr>
+          </a:p>
+          <a:p>
+            <a:pPr marL="971550" lvl="1" indent="-285750">
+              <a:buFont typeface="Arial"/>
+              <a:buChar char="•"/>
+            </a:pPr>
+            <a:r>
+              <a:rPr lang="en-IN" sz="2200" b="1" u="sng">
+                <a:ea typeface="+mn-lt"/>
+                <a:cs typeface="+mn-lt"/>
+              </a:rPr>
+              <a:t>Technical Feasibility</a:t>
+            </a:r>
+            <a:r>
+              <a:rPr lang="en-IN" sz="2200" b="1">
+                <a:ea typeface="+mn-lt"/>
+                <a:cs typeface="+mn-lt"/>
+              </a:rPr>
+              <a:t>:</a:t>
+            </a:r>
+            <a:r>
+              <a:rPr lang="en-IN" sz="2200">
+                <a:ea typeface="+mn-lt"/>
+                <a:cs typeface="+mn-lt"/>
+              </a:rPr>
+              <a:t> Evaluate the feasibility of implementing the required technology stack, including databases, hosting, and software development.</a:t>
+            </a:r>
+            <a:endParaRPr lang="en-IN" sz="2200">
+              <a:ea typeface="Calibri"/>
+              <a:cs typeface="Calibri"/>
+            </a:endParaRPr>
+          </a:p>
+          <a:p>
+            <a:pPr marL="971550" lvl="1" indent="-285750">
+              <a:buFont typeface="Arial"/>
+              <a:buChar char="•"/>
+            </a:pPr>
+            <a:r>
+              <a:rPr lang="en-IN" sz="2200" b="1" u="sng">
+                <a:ea typeface="+mn-lt"/>
+                <a:cs typeface="+mn-lt"/>
+              </a:rPr>
+              <a:t>Market Feasibility</a:t>
+            </a:r>
+            <a:r>
+              <a:rPr lang="en-IN" sz="2200" b="1">
+                <a:ea typeface="+mn-lt"/>
+                <a:cs typeface="+mn-lt"/>
+              </a:rPr>
+              <a:t>:</a:t>
+            </a:r>
+            <a:r>
+              <a:rPr lang="en-IN" sz="2200">
+                <a:ea typeface="+mn-lt"/>
+                <a:cs typeface="+mn-lt"/>
+              </a:rPr>
+              <a:t> Determine if there is a viable market for the service, considering factors like user acquisition costs, monetization strategies, and potential revenue streams.</a:t>
+            </a:r>
+            <a:endParaRPr lang="en-IN" sz="2200">
+              <a:ea typeface="Calibri"/>
+              <a:cs typeface="Calibri"/>
+            </a:endParaRPr>
+          </a:p>
+          <a:p>
             <a:pPr marL="0" indent="0">
               <a:buNone/>
             </a:pPr>
-            <a:endParaRPr lang="en-US">
-              <a:solidFill>
-                <a:schemeClr val="tx1">
-                  <a:lumMod val="65000"/>
-                  <a:lumOff val="35000"/>
-                </a:schemeClr>
-              </a:solidFill>
+            <a:endParaRPr lang="en-IN">
+              <a:latin typeface="calibri light"/>
+              <a:ea typeface="calibri light"/>
+              <a:cs typeface="Calibri"/>
             </a:endParaRPr>
           </a:p>
           <a:p>
             <a:pPr marL="0" indent="0">
               <a:buNone/>
             </a:pPr>
-            <a:endParaRPr lang="en-US">
-              <a:solidFill>
-                <a:schemeClr val="tx1">
-                  <a:lumMod val="65000"/>
-                  <a:lumOff val="35000"/>
-                </a:schemeClr>
-              </a:solidFill>
-            </a:endParaRPr>
-          </a:p>
-          <a:p>
-            <a:pPr marL="0" indent="0">
-              <a:buNone/>
-            </a:pPr>
-            <a:endParaRPr lang="en-US">
-              <a:solidFill>
-                <a:schemeClr val="tx1">
-                  <a:lumMod val="65000"/>
-                  <a:lumOff val="35000"/>
-                </a:schemeClr>
-              </a:solidFill>
-            </a:endParaRPr>
-          </a:p>
-          <a:p>
-            <a:pPr marL="0" indent="0">
-              <a:buNone/>
-            </a:pPr>
-            <a:endParaRPr lang="en-US">
-              <a:solidFill>
-                <a:schemeClr val="tx1">
-                  <a:lumMod val="65000"/>
-                  <a:lumOff val="35000"/>
-                </a:schemeClr>
-              </a:solidFill>
-            </a:endParaRPr>
-          </a:p>
-          <a:p>
-            <a:pPr marL="0" indent="0" algn="ctr">
-              <a:buNone/>
-            </a:pPr>
-            <a:r>
-              <a:rPr lang="en-US" sz="9600">
-                <a:solidFill>
-                  <a:schemeClr val="tx1">
-                    <a:lumMod val="65000"/>
-                    <a:lumOff val="35000"/>
-                  </a:schemeClr>
-                </a:solidFill>
-                <a:latin typeface="Century Gothic" panose="020B0502020202020204" pitchFamily="34" charset="0"/>
-              </a:rPr>
-              <a:t>Thank You</a:t>
-            </a:r>
-            <a:endParaRPr lang="en-IN" sz="9600">
-              <a:solidFill>
-                <a:schemeClr val="tx1">
-                  <a:lumMod val="65000"/>
-                  <a:lumOff val="35000"/>
-                </a:schemeClr>
-              </a:solidFill>
-              <a:latin typeface="Century Gothic" panose="020B0502020202020204" pitchFamily="34" charset="0"/>
+            <a:endParaRPr lang="en-IN">
+              <a:latin typeface="calibri light"/>
+              <a:ea typeface="calibri light"/>
+              <a:cs typeface="Calibri"/>
             </a:endParaRPr>
           </a:p>
         </p:txBody>
@@ -4351,7 +4779,7 @@
     </p:spTree>
     <p:extLst>
       <p:ext uri="{BB962C8B-B14F-4D97-AF65-F5344CB8AC3E}">
-        <p14:creationId xmlns:p14="http://schemas.microsoft.com/office/powerpoint/2010/main" val="1862747852"/>
+        <p14:creationId xmlns:p14="http://schemas.microsoft.com/office/powerpoint/2010/main" val="1448925615"/>
       </p:ext>
     </p:extLst>
   </p:cSld>
@@ -4380,81 +4808,24 @@
       </p:grpSpPr>
       <p:sp>
         <p:nvSpPr>
-          <p:cNvPr id="2" name="Title 1">
-            <a:extLst>
-              <a:ext uri="{FF2B5EF4-FFF2-40B4-BE49-F238E27FC236}">
-                <a16:creationId xmlns:a16="http://schemas.microsoft.com/office/drawing/2014/main" id="{F5228CC3-E8D4-42B1-B837-121B30534E51}"/>
-              </a:ext>
-            </a:extLst>
-          </p:cNvPr>
-          <p:cNvSpPr>
-            <a:spLocks noGrp="1"/>
-          </p:cNvSpPr>
-          <p:nvPr>
-            <p:ph type="title"/>
+          <p:cNvPr id="3" name="Content Placeholder 2">
+            <a:extLst>
+              <a:ext uri="{FF2B5EF4-FFF2-40B4-BE49-F238E27FC236}">
+                <a16:creationId xmlns:a16="http://schemas.microsoft.com/office/drawing/2014/main" id="{1A7ED7D1-5048-498B-B092-E807E58A1614}"/>
+              </a:ext>
+            </a:extLst>
+          </p:cNvPr>
+          <p:cNvSpPr>
+            <a:spLocks noGrp="1"/>
+          </p:cNvSpPr>
+          <p:nvPr>
+            <p:ph idx="1"/>
           </p:nvPr>
         </p:nvSpPr>
         <p:spPr>
           <a:xfrm>
-            <a:off x="-9659" y="224"/>
-            <a:ext cx="12264980" cy="327454"/>
-          </a:xfrm>
-        </p:spPr>
-        <p:txBody>
-          <a:bodyPr>
-            <a:normAutofit fontScale="90000"/>
-          </a:bodyPr>
-          <a:lstStyle/>
-          <a:p>
-            <a:pPr algn="ctr"/>
-            <a:br>
-              <a:rPr lang="en-US" sz="3000" dirty="0">
-                <a:latin typeface="BankGothic Lt BT"/>
-              </a:rPr>
-            </a:br>
-            <a:r>
-              <a:rPr lang="en-US" sz="3500" dirty="0">
-                <a:latin typeface="BankGothic Lt BT"/>
-              </a:rPr>
-              <a:t>home module</a:t>
-            </a:r>
-            <a:br>
-              <a:rPr lang="en-US" sz="3500" dirty="0">
-                <a:latin typeface="BankGothic Lt BT" panose="020B0607020203060204" pitchFamily="34" charset="0"/>
-              </a:rPr>
-            </a:br>
-            <a:r>
-              <a:rPr lang="en-US" sz="3000" dirty="0">
-                <a:latin typeface="BankGothic Lt BT"/>
-              </a:rPr>
-              <a:t>									     ~Aditya</a:t>
-            </a:r>
-            <a:endParaRPr lang="en-IN" sz="3000">
-              <a:latin typeface="BankGothic Lt BT"/>
-            </a:endParaRPr>
-          </a:p>
-        </p:txBody>
-      </p:sp>
-      <p:sp>
-        <p:nvSpPr>
-          <p:cNvPr id="3" name="Content Placeholder 2">
-            <a:extLst>
-              <a:ext uri="{FF2B5EF4-FFF2-40B4-BE49-F238E27FC236}">
-                <a16:creationId xmlns:a16="http://schemas.microsoft.com/office/drawing/2014/main" id="{925BC252-3007-494A-A136-018AC5223F6E}"/>
-              </a:ext>
-            </a:extLst>
-          </p:cNvPr>
-          <p:cNvSpPr>
-            <a:spLocks noGrp="1"/>
-          </p:cNvSpPr>
-          <p:nvPr>
-            <p:ph idx="1"/>
-          </p:nvPr>
-        </p:nvSpPr>
-        <p:spPr>
-          <a:xfrm>
-            <a:off x="-3773" y="732480"/>
-            <a:ext cx="12197989" cy="6120623"/>
+            <a:off x="3843" y="2647"/>
+            <a:ext cx="12227244" cy="6856626"/>
           </a:xfrm>
         </p:spPr>
         <p:txBody>
@@ -4463,53 +4834,25 @@
           </a:bodyPr>
           <a:lstStyle/>
           <a:p>
-            <a:r>
-              <a:rPr lang="en-IN" sz="2500" dirty="0">
-                <a:latin typeface="calibri light"/>
-                <a:cs typeface="Calibri"/>
-              </a:rPr>
-              <a:t>The "Home" module for our website "</a:t>
-            </a:r>
-            <a:r>
-              <a:rPr lang="en-IN" sz="2500" err="1">
-                <a:latin typeface="calibri light"/>
-                <a:cs typeface="Calibri"/>
-              </a:rPr>
-              <a:t>RoomR</a:t>
-            </a:r>
-            <a:r>
-              <a:rPr lang="en-IN" sz="2500" dirty="0">
-                <a:latin typeface="calibri light"/>
-                <a:cs typeface="Calibri"/>
-              </a:rPr>
-              <a:t>" serves as the landing page and provides a clear and engaging introduction to the platform's purpose and features. Here's a breakdown of what we'll include in this module:</a:t>
-            </a:r>
-            <a:endParaRPr lang="en-US" sz="2500">
-              <a:latin typeface="calibri light"/>
-              <a:ea typeface="calibri light"/>
-              <a:cs typeface="Calibri"/>
-            </a:endParaRPr>
-          </a:p>
-          <a:p>
-            <a:pPr marL="342900" indent="-342900">
+            <a:pPr marL="457200" indent="-457200">
               <a:buFont typeface="Wingdings"/>
               <a:buChar char="v"/>
             </a:pPr>
             <a:r>
-              <a:rPr lang="en-IN" sz="2400" b="1" u="sng" dirty="0">
-                <a:ea typeface="+mn-lt"/>
-                <a:cs typeface="+mn-lt"/>
-              </a:rPr>
-              <a:t>Demand Analysis</a:t>
-            </a:r>
-            <a:r>
-              <a:rPr lang="en-IN" sz="2400" b="1" dirty="0">
+              <a:rPr lang="en-IN" sz="2500" b="1" u="sng">
+                <a:ea typeface="+mn-lt"/>
+                <a:cs typeface="+mn-lt"/>
+              </a:rPr>
+              <a:t>Technical Analysis</a:t>
+            </a:r>
+            <a:r>
+              <a:rPr lang="en-IN" sz="2500" b="1">
                 <a:ea typeface="+mn-lt"/>
                 <a:cs typeface="+mn-lt"/>
               </a:rPr>
               <a:t>:</a:t>
             </a:r>
-            <a:endParaRPr lang="en-IN" sz="2400" dirty="0">
+            <a:endParaRPr lang="en-US" sz="2500">
               <a:ea typeface="Calibri"/>
               <a:cs typeface="Calibri"/>
             </a:endParaRPr>
@@ -4520,27 +4863,27 @@
               <a:buChar char="•"/>
             </a:pPr>
             <a:r>
-              <a:rPr lang="en-IN" sz="2100" b="1" u="sng" dirty="0">
-                <a:ea typeface="+mn-lt"/>
-                <a:cs typeface="+mn-lt"/>
-              </a:rPr>
-              <a:t>Market Research</a:t>
-            </a:r>
-            <a:r>
-              <a:rPr lang="en-IN" sz="2100" b="1" dirty="0">
+              <a:rPr lang="en-IN" b="1" u="sng">
+                <a:ea typeface="+mn-lt"/>
+                <a:cs typeface="+mn-lt"/>
+              </a:rPr>
+              <a:t>Platform Selection</a:t>
+            </a:r>
+            <a:r>
+              <a:rPr lang="en-IN" b="1">
                 <a:ea typeface="+mn-lt"/>
                 <a:cs typeface="+mn-lt"/>
               </a:rPr>
               <a:t>:</a:t>
             </a:r>
             <a:r>
-              <a:rPr lang="en-IN" sz="2100" dirty="0">
-                <a:ea typeface="+mn-lt"/>
-                <a:cs typeface="+mn-lt"/>
-              </a:rPr>
-              <a:t> Conduct a market research to understand the demand for roommate finding services in your target region. Analyse demographics, housing trends, and the need for such a platform.</a:t>
-            </a:r>
-            <a:endParaRPr lang="en-IN" sz="2100" dirty="0">
+              <a:rPr lang="en-IN">
+                <a:ea typeface="+mn-lt"/>
+                <a:cs typeface="+mn-lt"/>
+              </a:rPr>
+              <a:t> Choose the appropriate technology stack and platform for developing the website e.g., web development frameworks</a:t>
+            </a:r>
+            <a:endParaRPr lang="en-IN">
               <a:ea typeface="Calibri"/>
               <a:cs typeface="Calibri"/>
             </a:endParaRPr>
@@ -4551,27 +4894,27 @@
               <a:buChar char="•"/>
             </a:pPr>
             <a:r>
-              <a:rPr lang="en-IN" sz="2100" b="1" u="sng" dirty="0">
-                <a:ea typeface="+mn-lt"/>
-                <a:cs typeface="+mn-lt"/>
-              </a:rPr>
-              <a:t>User Needs</a:t>
-            </a:r>
-            <a:r>
-              <a:rPr lang="en-IN" sz="2100" b="1" dirty="0">
+              <a:rPr lang="en-IN" b="1" u="sng">
+                <a:ea typeface="+mn-lt"/>
+                <a:cs typeface="+mn-lt"/>
+              </a:rPr>
+              <a:t>Scalability</a:t>
+            </a:r>
+            <a:r>
+              <a:rPr lang="en-IN" b="1">
                 <a:ea typeface="+mn-lt"/>
                 <a:cs typeface="+mn-lt"/>
               </a:rPr>
               <a:t>:</a:t>
             </a:r>
             <a:r>
-              <a:rPr lang="en-IN" sz="2100" dirty="0">
-                <a:ea typeface="+mn-lt"/>
-                <a:cs typeface="+mn-lt"/>
-              </a:rPr>
-              <a:t> Identify user needs and pain points related to finding roommates. Consider conducting surveys or user interviews to gather insights.</a:t>
-            </a:r>
-            <a:endParaRPr lang="en-IN" sz="2100">
+              <a:rPr lang="en-IN">
+                <a:ea typeface="+mn-lt"/>
+                <a:cs typeface="+mn-lt"/>
+              </a:rPr>
+              <a:t> Ensure the technical architecture can handle potential growth in users and data volume.</a:t>
+            </a:r>
+            <a:endParaRPr lang="en-IN">
               <a:ea typeface="Calibri"/>
               <a:cs typeface="Calibri"/>
             </a:endParaRPr>
@@ -4582,51 +4925,27 @@
               <a:buChar char="•"/>
             </a:pPr>
             <a:r>
-              <a:rPr lang="en-IN" sz="2100" b="1" u="sng" dirty="0">
-                <a:ea typeface="+mn-lt"/>
-                <a:cs typeface="+mn-lt"/>
-              </a:rPr>
-              <a:t>Competitive Landscape</a:t>
-            </a:r>
-            <a:r>
-              <a:rPr lang="en-IN" sz="2100" b="1" dirty="0">
+              <a:rPr lang="en-IN" b="1" u="sng">
+                <a:ea typeface="+mn-lt"/>
+                <a:cs typeface="+mn-lt"/>
+              </a:rPr>
+              <a:t>Security</a:t>
+            </a:r>
+            <a:r>
+              <a:rPr lang="en-IN" b="1">
                 <a:ea typeface="+mn-lt"/>
                 <a:cs typeface="+mn-lt"/>
               </a:rPr>
               <a:t>:</a:t>
             </a:r>
             <a:r>
-              <a:rPr lang="en-IN" sz="2100" dirty="0">
-                <a:ea typeface="+mn-lt"/>
-                <a:cs typeface="+mn-lt"/>
-              </a:rPr>
-              <a:t> Analyse competitors in the roommate finding space to understand their strengths and weaknesses.</a:t>
-            </a:r>
-            <a:endParaRPr lang="en-IN" sz="2100">
-              <a:ea typeface="Calibri"/>
-              <a:cs typeface="Calibri"/>
-            </a:endParaRPr>
-          </a:p>
-          <a:p>
-            <a:pPr marL="342900" indent="-342900">
-              <a:buFont typeface="Wingdings"/>
-              <a:buChar char="v"/>
-            </a:pPr>
-            <a:r>
-              <a:rPr lang="en-IN" sz="2400" b="1" u="sng" dirty="0">
-                <a:ea typeface="+mn-lt"/>
-                <a:cs typeface="+mn-lt"/>
-              </a:rPr>
-              <a:t>Feasibility Analysis</a:t>
-            </a:r>
-            <a:r>
-              <a:rPr lang="en-IN" sz="2400" b="1" dirty="0">
-                <a:ea typeface="+mn-lt"/>
-                <a:cs typeface="+mn-lt"/>
-              </a:rPr>
-              <a:t>:</a:t>
-            </a:r>
-            <a:endParaRPr lang="en-IN" sz="2400">
+              <a:rPr lang="en-IN">
+                <a:ea typeface="+mn-lt"/>
+                <a:cs typeface="+mn-lt"/>
+              </a:rPr>
+              <a:t> Implement robust security measures to protect user data and ensure privacy.</a:t>
+            </a:r>
+            <a:endParaRPr lang="en-IN">
               <a:ea typeface="Calibri"/>
               <a:cs typeface="Calibri"/>
             </a:endParaRPr>
@@ -4637,119 +4956,217 @@
               <a:buChar char="•"/>
             </a:pPr>
             <a:r>
-              <a:rPr lang="en-IN" sz="2200" b="1" u="sng" dirty="0">
-                <a:ea typeface="+mn-lt"/>
-                <a:cs typeface="+mn-lt"/>
-              </a:rPr>
-              <a:t>Legal and Regulatory</a:t>
-            </a:r>
-            <a:r>
-              <a:rPr lang="en-IN" sz="2200" b="1" dirty="0">
+              <a:rPr lang="en-IN" b="1" u="sng">
+                <a:ea typeface="+mn-lt"/>
+                <a:cs typeface="+mn-lt"/>
+              </a:rPr>
+              <a:t>Performance</a:t>
+            </a:r>
+            <a:r>
+              <a:rPr lang="en-IN" b="1">
                 <a:ea typeface="+mn-lt"/>
                 <a:cs typeface="+mn-lt"/>
               </a:rPr>
               <a:t>:</a:t>
             </a:r>
             <a:r>
-              <a:rPr lang="en-IN" sz="2200" dirty="0">
-                <a:ea typeface="+mn-lt"/>
-                <a:cs typeface="+mn-lt"/>
-              </a:rPr>
-              <a:t> Assess the legal and regulatory requirements for operating a roommate finder website, including data privacy laws, user agreements, and intellectual property rights.</a:t>
-            </a:r>
-            <a:endParaRPr lang="en-IN" sz="2200">
+              <a:rPr lang="en-IN">
+                <a:ea typeface="+mn-lt"/>
+                <a:cs typeface="+mn-lt"/>
+              </a:rPr>
+              <a:t> Optimize the website for fast loading times, smooth user experience, and cross-browser compatibility.</a:t>
+            </a:r>
+            <a:endParaRPr lang="en-IN">
               <a:ea typeface="Calibri"/>
               <a:cs typeface="Calibri"/>
             </a:endParaRPr>
           </a:p>
           <a:p>
-            <a:pPr marL="971550" lvl="1" indent="-285750">
+            <a:pPr marL="457200" indent="-457200">
+              <a:buFont typeface="Wingdings"/>
+              <a:buChar char="v"/>
+            </a:pPr>
+            <a:r>
+              <a:rPr lang="en-IN" sz="2400" b="1" u="sng">
+                <a:ea typeface="+mn-lt"/>
+                <a:cs typeface="+mn-lt"/>
+              </a:rPr>
+              <a:t>Manpower Analysis</a:t>
+            </a:r>
+            <a:r>
+              <a:rPr lang="en-IN" sz="2400" b="1">
+                <a:ea typeface="+mn-lt"/>
+                <a:cs typeface="+mn-lt"/>
+              </a:rPr>
+              <a:t>:</a:t>
+            </a:r>
+            <a:endParaRPr lang="en-IN">
+              <a:ea typeface="+mn-lt"/>
+              <a:cs typeface="+mn-lt"/>
+            </a:endParaRPr>
+          </a:p>
+          <a:p>
+            <a:pPr marL="457200" indent="-457200">
               <a:buFont typeface="Arial"/>
               <a:buChar char="•"/>
             </a:pPr>
             <a:r>
-              <a:rPr lang="en-IN" sz="2200" b="1" u="sng" dirty="0">
-                <a:ea typeface="+mn-lt"/>
-                <a:cs typeface="+mn-lt"/>
-              </a:rPr>
-              <a:t>Technical Feasibility</a:t>
-            </a:r>
-            <a:r>
-              <a:rPr lang="en-IN" sz="2200" b="1" dirty="0">
+              <a:rPr lang="en-IN" sz="2400" b="1" u="sng">
+                <a:ea typeface="+mn-lt"/>
+                <a:cs typeface="+mn-lt"/>
+              </a:rPr>
+              <a:t>Skill Assessment</a:t>
+            </a:r>
+            <a:r>
+              <a:rPr lang="en-IN" sz="2400" b="1">
                 <a:ea typeface="+mn-lt"/>
                 <a:cs typeface="+mn-lt"/>
               </a:rPr>
               <a:t>:</a:t>
             </a:r>
             <a:r>
-              <a:rPr lang="en-IN" sz="2200" dirty="0">
-                <a:ea typeface="+mn-lt"/>
-                <a:cs typeface="+mn-lt"/>
-              </a:rPr>
-              <a:t> Evaluate the feasibility of implementing the required technology stack, including databases, hosting, and software development.</a:t>
-            </a:r>
-            <a:endParaRPr lang="en-IN" sz="2200">
+              <a:rPr lang="en-IN" sz="2400">
+                <a:ea typeface="+mn-lt"/>
+                <a:cs typeface="+mn-lt"/>
+              </a:rPr>
+              <a:t> Assess the skills and expertise needed for each role and evaluate whether you have the necessary talent for example:</a:t>
+            </a:r>
+            <a:r>
+              <a:rPr lang="en-IN">
+                <a:ea typeface="+mn-lt"/>
+                <a:cs typeface="+mn-lt"/>
+              </a:rPr>
+              <a:t> </a:t>
+            </a:r>
+          </a:p>
+          <a:p>
+            <a:pPr marL="0" indent="0">
+              <a:buNone/>
+            </a:pPr>
+            <a:r>
+              <a:rPr lang="en-IN" sz="2400" b="1">
+                <a:ea typeface="+mn-lt"/>
+                <a:cs typeface="+mn-lt"/>
+              </a:rPr>
+              <a:t>        1)  </a:t>
+            </a:r>
+            <a:r>
+              <a:rPr lang="en-IN" sz="2400" b="1" u="sng">
+                <a:ea typeface="+mn-lt"/>
+                <a:cs typeface="+mn-lt"/>
+              </a:rPr>
+              <a:t>Front-End Developer</a:t>
+            </a:r>
+            <a:r>
+              <a:rPr lang="en-IN" sz="2400" b="1">
+                <a:ea typeface="+mn-lt"/>
+                <a:cs typeface="+mn-lt"/>
+              </a:rPr>
+              <a:t>:</a:t>
+            </a:r>
+            <a:r>
+              <a:rPr lang="en-IN" sz="2400">
+                <a:ea typeface="+mn-lt"/>
+                <a:cs typeface="+mn-lt"/>
+              </a:rPr>
+              <a:t> To convert the design into a functional web page with HTML, CSS,                 and JavaScript.</a:t>
+            </a:r>
+            <a:endParaRPr lang="en-IN">
+              <a:ea typeface="+mn-lt"/>
+              <a:cs typeface="+mn-lt"/>
+            </a:endParaRPr>
+          </a:p>
+          <a:p>
+            <a:pPr marL="0" indent="0">
+              <a:buNone/>
+            </a:pPr>
+            <a:r>
+              <a:rPr lang="en-IN" sz="2400" b="1">
+                <a:ea typeface="+mn-lt"/>
+                <a:cs typeface="+mn-lt"/>
+              </a:rPr>
+              <a:t>         2)  </a:t>
+            </a:r>
+            <a:r>
+              <a:rPr lang="en-IN" sz="2400" b="1" u="sng">
+                <a:ea typeface="+mn-lt"/>
+                <a:cs typeface="+mn-lt"/>
+              </a:rPr>
+              <a:t>Back-End Developer</a:t>
+            </a:r>
+            <a:r>
+              <a:rPr lang="en-IN" sz="2400" b="1">
+                <a:ea typeface="+mn-lt"/>
+                <a:cs typeface="+mn-lt"/>
+              </a:rPr>
+              <a:t>:</a:t>
+            </a:r>
+            <a:r>
+              <a:rPr lang="en-IN" sz="2400">
+                <a:ea typeface="+mn-lt"/>
+                <a:cs typeface="+mn-lt"/>
+              </a:rPr>
+              <a:t> To handle server-side functionality, user authentication, and                              database integration.</a:t>
+            </a:r>
+            <a:endParaRPr lang="en-IN">
+              <a:ea typeface="+mn-lt"/>
+              <a:cs typeface="+mn-lt"/>
+            </a:endParaRPr>
+          </a:p>
+          <a:p>
+            <a:pPr marL="457200" indent="-457200"/>
+            <a:r>
+              <a:rPr lang="en-IN" sz="2400" b="1" u="sng">
+                <a:ea typeface="+mn-lt"/>
+                <a:cs typeface="+mn-lt"/>
+              </a:rPr>
+              <a:t>Resource Allocation</a:t>
+            </a:r>
+            <a:r>
+              <a:rPr lang="en-IN" sz="2400" b="1">
+                <a:ea typeface="+mn-lt"/>
+                <a:cs typeface="+mn-lt"/>
+              </a:rPr>
+              <a:t>:</a:t>
+            </a:r>
+            <a:r>
+              <a:rPr lang="en-IN" sz="2400">
+                <a:ea typeface="+mn-lt"/>
+                <a:cs typeface="+mn-lt"/>
+              </a:rPr>
+              <a:t> Allocate human resources effectively to meet development timelines and project milestones.</a:t>
+            </a:r>
+            <a:endParaRPr lang="en-IN" sz="2400">
               <a:ea typeface="Calibri"/>
               <a:cs typeface="Calibri"/>
             </a:endParaRPr>
           </a:p>
           <a:p>
-            <a:pPr marL="971550" lvl="1" indent="-285750">
-              <a:buFont typeface="Arial"/>
-              <a:buChar char="•"/>
+            <a:pPr marL="0" indent="0">
+              <a:buNone/>
             </a:pPr>
-            <a:r>
-              <a:rPr lang="en-IN" sz="2200" b="1" u="sng" dirty="0">
-                <a:ea typeface="+mn-lt"/>
-                <a:cs typeface="+mn-lt"/>
-              </a:rPr>
-              <a:t>Market Feasibility</a:t>
-            </a:r>
-            <a:r>
-              <a:rPr lang="en-IN" sz="2200" b="1" dirty="0">
-                <a:ea typeface="+mn-lt"/>
-                <a:cs typeface="+mn-lt"/>
-              </a:rPr>
-              <a:t>:</a:t>
-            </a:r>
-            <a:r>
-              <a:rPr lang="en-IN" sz="2200" dirty="0">
-                <a:ea typeface="+mn-lt"/>
-                <a:cs typeface="+mn-lt"/>
-              </a:rPr>
-              <a:t> Determine if there is a viable market for the service, considering factors like user acquisition costs, monetization strategies, and potential revenue streams.</a:t>
-            </a:r>
-            <a:endParaRPr lang="en-IN" sz="2200">
-              <a:ea typeface="Calibri"/>
-              <a:cs typeface="Calibri"/>
+            <a:endParaRPr lang="en-IN" sz="2400" b="1" u="sng">
+              <a:latin typeface="calibri light"/>
+              <a:ea typeface="+mn-lt"/>
+              <a:cs typeface="calibri light"/>
             </a:endParaRPr>
           </a:p>
           <a:p>
             <a:pPr marL="0" indent="0">
               <a:buNone/>
             </a:pPr>
-            <a:endParaRPr lang="en-IN" dirty="0">
+            <a:endParaRPr lang="en-IN" sz="2400">
               <a:latin typeface="calibri light"/>
               <a:ea typeface="calibri light"/>
               <a:cs typeface="Calibri"/>
             </a:endParaRPr>
           </a:p>
-          <a:p>
-            <a:pPr marL="0" indent="0">
-              <a:buNone/>
-            </a:pPr>
-            <a:endParaRPr lang="en-IN">
-              <a:latin typeface="calibri light"/>
-              <a:ea typeface="calibri light"/>
-              <a:cs typeface="Calibri"/>
-            </a:endParaRPr>
-          </a:p>
         </p:txBody>
       </p:sp>
     </p:spTree>
     <p:extLst>
       <p:ext uri="{BB962C8B-B14F-4D97-AF65-F5344CB8AC3E}">
-        <p14:creationId xmlns:p14="http://schemas.microsoft.com/office/powerpoint/2010/main" val="1448925615"/>
+        <p14:creationId xmlns:p14="http://schemas.microsoft.com/office/powerpoint/2010/main" val="2289503668"/>
       </p:ext>
     </p:extLst>
   </p:cSld>
@@ -4804,25 +5221,135 @@
           </a:bodyPr>
           <a:lstStyle/>
           <a:p>
+            <a:pPr marL="514350" indent="-514350">
+              <a:buFont typeface="Wingdings" panose="020B0604020202020204" pitchFamily="34" charset="0"/>
+              <a:buChar char="v"/>
+            </a:pPr>
+            <a:r>
+              <a:rPr lang="en-IN" sz="2900" b="1" u="sng">
+                <a:ea typeface="+mn-lt"/>
+                <a:cs typeface="+mn-lt"/>
+              </a:rPr>
+              <a:t>Financial Analysis</a:t>
+            </a:r>
+            <a:r>
+              <a:rPr lang="en-IN" sz="2900" b="1">
+                <a:ea typeface="+mn-lt"/>
+                <a:cs typeface="+mn-lt"/>
+              </a:rPr>
+              <a:t>:</a:t>
+            </a:r>
+            <a:endParaRPr lang="en-US" sz="2900">
+              <a:ea typeface="Calibri"/>
+              <a:cs typeface="Calibri"/>
+            </a:endParaRPr>
+          </a:p>
+          <a:p>
+            <a:pPr marL="971550" lvl="1" indent="-285750">
+              <a:buFont typeface="Arial"/>
+              <a:buChar char="•"/>
+            </a:pPr>
+            <a:r>
+              <a:rPr lang="en-IN" sz="2900" b="1" u="sng">
+                <a:ea typeface="+mn-lt"/>
+                <a:cs typeface="+mn-lt"/>
+              </a:rPr>
+              <a:t>Cost Estimation</a:t>
+            </a:r>
+            <a:r>
+              <a:rPr lang="en-IN" sz="2900" b="1">
+                <a:ea typeface="+mn-lt"/>
+                <a:cs typeface="+mn-lt"/>
+              </a:rPr>
+              <a:t>:</a:t>
+            </a:r>
+            <a:r>
+              <a:rPr lang="en-IN" sz="2900">
+                <a:ea typeface="+mn-lt"/>
+                <a:cs typeface="+mn-lt"/>
+              </a:rPr>
+              <a:t> Estimate the initial and ongoing costs, including development, hosting, marketing, and administrative expenses.</a:t>
+            </a:r>
+            <a:endParaRPr lang="en-IN" sz="2900">
+              <a:ea typeface="Calibri"/>
+              <a:cs typeface="Calibri"/>
+            </a:endParaRPr>
+          </a:p>
+          <a:p>
+            <a:pPr marL="971550" lvl="1" indent="-285750">
+              <a:buFont typeface="Arial"/>
+              <a:buChar char="•"/>
+            </a:pPr>
+            <a:r>
+              <a:rPr lang="en-IN" sz="2900" b="1" u="sng">
+                <a:ea typeface="+mn-lt"/>
+                <a:cs typeface="+mn-lt"/>
+              </a:rPr>
+              <a:t>Revenue Projections</a:t>
+            </a:r>
+            <a:r>
+              <a:rPr lang="en-IN" sz="2900" b="1">
+                <a:ea typeface="+mn-lt"/>
+                <a:cs typeface="+mn-lt"/>
+              </a:rPr>
+              <a:t>:</a:t>
+            </a:r>
+            <a:r>
+              <a:rPr lang="en-IN" sz="2900">
+                <a:ea typeface="+mn-lt"/>
+                <a:cs typeface="+mn-lt"/>
+              </a:rPr>
+              <a:t> Create revenue models based on subscription fees, advertising, premium features, or any other monetization strategy.</a:t>
+            </a:r>
+            <a:endParaRPr lang="en-IN" sz="2900">
+              <a:ea typeface="Calibri"/>
+              <a:cs typeface="Calibri"/>
+            </a:endParaRPr>
+          </a:p>
+          <a:p>
+            <a:pPr marL="971550" lvl="1" indent="-285750">
+              <a:buFont typeface="Arial"/>
+              <a:buChar char="•"/>
+            </a:pPr>
+            <a:r>
+              <a:rPr lang="en-IN" sz="2900" b="1" u="sng">
+                <a:ea typeface="+mn-lt"/>
+                <a:cs typeface="+mn-lt"/>
+              </a:rPr>
+              <a:t>Break-even Analysis</a:t>
+            </a:r>
+            <a:r>
+              <a:rPr lang="en-IN" sz="2900" b="1">
+                <a:ea typeface="+mn-lt"/>
+                <a:cs typeface="+mn-lt"/>
+              </a:rPr>
+              <a:t>:</a:t>
+            </a:r>
+            <a:r>
+              <a:rPr lang="en-IN" sz="2900">
+                <a:ea typeface="+mn-lt"/>
+                <a:cs typeface="+mn-lt"/>
+              </a:rPr>
+              <a:t> Determine the point at which the website will cover its costs and begin generating profits.</a:t>
+            </a:r>
+            <a:endParaRPr lang="en-IN" sz="2900">
+              <a:ea typeface="Calibri"/>
+              <a:cs typeface="Calibri"/>
+            </a:endParaRPr>
+          </a:p>
+          <a:p>
             <a:pPr marL="457200" indent="-457200">
               <a:buFont typeface="Wingdings"/>
               <a:buChar char="v"/>
             </a:pPr>
             <a:r>
-              <a:rPr lang="en-IN" sz="2500" b="1" u="sng" dirty="0">
-                <a:ea typeface="+mn-lt"/>
-                <a:cs typeface="+mn-lt"/>
-              </a:rPr>
-              <a:t>Technical Analysis</a:t>
-            </a:r>
-            <a:r>
-              <a:rPr lang="en-IN" sz="2500" b="1" dirty="0">
-                <a:ea typeface="+mn-lt"/>
-                <a:cs typeface="+mn-lt"/>
-              </a:rPr>
-              <a:t>:</a:t>
-            </a:r>
-            <a:endParaRPr lang="en-US" sz="2500">
+              <a:rPr lang="en-IN" sz="2900" b="1">
+                <a:ea typeface="+mn-lt"/>
+                <a:cs typeface="+mn-lt"/>
+              </a:rPr>
+              <a:t>Requirement Analysis:</a:t>
+            </a:r>
+            <a:endParaRPr lang="en-IN" sz="2900">
               <a:ea typeface="Calibri"/>
               <a:cs typeface="Calibri"/>
             </a:endParaRPr>
@@ -4833,27 +5360,27 @@
               <a:buChar char="•"/>
             </a:pPr>
             <a:r>
-              <a:rPr lang="en-IN" b="1" u="sng" dirty="0">
-                <a:ea typeface="+mn-lt"/>
-                <a:cs typeface="+mn-lt"/>
-              </a:rPr>
-              <a:t>Platform Selection</a:t>
-            </a:r>
-            <a:r>
-              <a:rPr lang="en-IN" b="1" dirty="0">
+              <a:rPr lang="en-IN" sz="2900" b="1" u="sng">
+                <a:ea typeface="+mn-lt"/>
+                <a:cs typeface="+mn-lt"/>
+              </a:rPr>
+              <a:t>User Stories</a:t>
+            </a:r>
+            <a:r>
+              <a:rPr lang="en-IN" sz="2900" b="1">
                 <a:ea typeface="+mn-lt"/>
                 <a:cs typeface="+mn-lt"/>
               </a:rPr>
               <a:t>:</a:t>
             </a:r>
             <a:r>
-              <a:rPr lang="en-IN" dirty="0">
-                <a:ea typeface="+mn-lt"/>
-                <a:cs typeface="+mn-lt"/>
-              </a:rPr>
-              <a:t> Choose the appropriate technology stack and platform for developing the website e.g., web development frameworks</a:t>
-            </a:r>
-            <a:endParaRPr lang="en-IN">
+              <a:rPr lang="en-IN" sz="2900">
+                <a:ea typeface="+mn-lt"/>
+                <a:cs typeface="+mn-lt"/>
+              </a:rPr>
+              <a:t> Create user stories and use cases to define the functionality and features required on the home page and throughout the website.</a:t>
+            </a:r>
+            <a:endParaRPr lang="en-IN" sz="2900">
               <a:ea typeface="Calibri"/>
               <a:cs typeface="Calibri"/>
             </a:endParaRPr>
@@ -4864,27 +5391,27 @@
               <a:buChar char="•"/>
             </a:pPr>
             <a:r>
-              <a:rPr lang="en-IN" b="1" u="sng" dirty="0">
-                <a:ea typeface="+mn-lt"/>
-                <a:cs typeface="+mn-lt"/>
-              </a:rPr>
-              <a:t>Scalability</a:t>
-            </a:r>
-            <a:r>
-              <a:rPr lang="en-IN" b="1" dirty="0">
+              <a:rPr lang="en-IN" sz="2900" b="1" u="sng">
+                <a:ea typeface="+mn-lt"/>
+                <a:cs typeface="+mn-lt"/>
+              </a:rPr>
+              <a:t>Feature Prioritization</a:t>
+            </a:r>
+            <a:r>
+              <a:rPr lang="en-IN" sz="2900" b="1">
                 <a:ea typeface="+mn-lt"/>
                 <a:cs typeface="+mn-lt"/>
               </a:rPr>
               <a:t>:</a:t>
             </a:r>
             <a:r>
-              <a:rPr lang="en-IN" dirty="0">
-                <a:ea typeface="+mn-lt"/>
-                <a:cs typeface="+mn-lt"/>
-              </a:rPr>
-              <a:t> Ensure the technical architecture can handle potential growth in users and data volume.</a:t>
-            </a:r>
-            <a:endParaRPr lang="en-IN">
+              <a:rPr lang="en-IN" sz="2900">
+                <a:ea typeface="+mn-lt"/>
+                <a:cs typeface="+mn-lt"/>
+              </a:rPr>
+              <a:t> Prioritize features based on user needs, business goals, and development resources.</a:t>
+            </a:r>
+            <a:endParaRPr lang="en-IN" sz="2900">
               <a:ea typeface="Calibri"/>
               <a:cs typeface="Calibri"/>
             </a:endParaRPr>
@@ -4895,227 +5422,36 @@
               <a:buChar char="•"/>
             </a:pPr>
             <a:r>
-              <a:rPr lang="en-IN" b="1" u="sng" dirty="0">
-                <a:ea typeface="+mn-lt"/>
-                <a:cs typeface="+mn-lt"/>
-              </a:rPr>
-              <a:t>Security</a:t>
-            </a:r>
-            <a:r>
-              <a:rPr lang="en-IN" b="1" dirty="0">
+              <a:rPr lang="en-IN" sz="2900" b="1" u="sng">
+                <a:ea typeface="+mn-lt"/>
+                <a:cs typeface="+mn-lt"/>
+              </a:rPr>
+              <a:t>Content Requirements</a:t>
+            </a:r>
+            <a:r>
+              <a:rPr lang="en-IN" sz="2900" b="1">
                 <a:ea typeface="+mn-lt"/>
                 <a:cs typeface="+mn-lt"/>
               </a:rPr>
               <a:t>:</a:t>
             </a:r>
             <a:r>
-              <a:rPr lang="en-IN" dirty="0">
-                <a:ea typeface="+mn-lt"/>
-                <a:cs typeface="+mn-lt"/>
-              </a:rPr>
-              <a:t> Implement robust security measures to protect user data and ensure privacy.</a:t>
-            </a:r>
-            <a:endParaRPr lang="en-IN">
+              <a:rPr lang="en-IN" sz="2900">
+                <a:ea typeface="+mn-lt"/>
+                <a:cs typeface="+mn-lt"/>
+              </a:rPr>
+              <a:t> Identify the content elements such as text, images, videos, and user-generated content necessary for the home page.</a:t>
+            </a:r>
+            <a:endParaRPr lang="en-IN" sz="2900">
               <a:ea typeface="Calibri"/>
               <a:cs typeface="Calibri"/>
             </a:endParaRPr>
           </a:p>
           <a:p>
-            <a:pPr marL="971550" lvl="1" indent="-285750">
-              <a:buFont typeface="Arial"/>
-              <a:buChar char="•"/>
+            <a:pPr marL="0" indent="0">
+              <a:buNone/>
             </a:pPr>
-            <a:r>
-              <a:rPr lang="en-IN" b="1" u="sng" dirty="0">
-                <a:ea typeface="+mn-lt"/>
-                <a:cs typeface="+mn-lt"/>
-              </a:rPr>
-              <a:t>Performance</a:t>
-            </a:r>
-            <a:r>
-              <a:rPr lang="en-IN" b="1" dirty="0">
-                <a:ea typeface="+mn-lt"/>
-                <a:cs typeface="+mn-lt"/>
-              </a:rPr>
-              <a:t>:</a:t>
-            </a:r>
-            <a:r>
-              <a:rPr lang="en-IN" dirty="0">
-                <a:ea typeface="+mn-lt"/>
-                <a:cs typeface="+mn-lt"/>
-              </a:rPr>
-              <a:t> Optimize the website for fast loading times, smooth user experience, and cross-browser compatibility.</a:t>
-            </a:r>
-            <a:endParaRPr lang="en-IN">
-              <a:ea typeface="Calibri"/>
-              <a:cs typeface="Calibri"/>
-            </a:endParaRPr>
-          </a:p>
-          <a:p>
-            <a:pPr marL="457200" indent="-457200">
-              <a:buFont typeface="Wingdings"/>
-              <a:buChar char="v"/>
-            </a:pPr>
-            <a:r>
-              <a:rPr lang="en-IN" sz="2400" b="1" u="sng" dirty="0">
-                <a:ea typeface="+mn-lt"/>
-                <a:cs typeface="+mn-lt"/>
-              </a:rPr>
-              <a:t>Manpower Analysis</a:t>
-            </a:r>
-            <a:r>
-              <a:rPr lang="en-IN" sz="2400" b="1" dirty="0">
-                <a:ea typeface="+mn-lt"/>
-                <a:cs typeface="+mn-lt"/>
-              </a:rPr>
-              <a:t>:</a:t>
-            </a:r>
-            <a:endParaRPr lang="en-IN" dirty="0">
-              <a:ea typeface="+mn-lt"/>
-              <a:cs typeface="+mn-lt"/>
-            </a:endParaRPr>
-          </a:p>
-          <a:p>
-            <a:pPr marL="457200" indent="-457200">
-              <a:buFont typeface="Arial"/>
-              <a:buChar char="•"/>
-            </a:pPr>
-            <a:r>
-              <a:rPr lang="en-IN" sz="2400" b="1" u="sng" dirty="0">
-                <a:ea typeface="+mn-lt"/>
-                <a:cs typeface="+mn-lt"/>
-              </a:rPr>
-              <a:t>Skill Assessment</a:t>
-            </a:r>
-            <a:r>
-              <a:rPr lang="en-IN" sz="2400" b="1" dirty="0">
-                <a:ea typeface="+mn-lt"/>
-                <a:cs typeface="+mn-lt"/>
-              </a:rPr>
-              <a:t>:</a:t>
-            </a:r>
-            <a:r>
-              <a:rPr lang="en-IN" sz="2400" dirty="0">
-                <a:ea typeface="+mn-lt"/>
-                <a:cs typeface="+mn-lt"/>
-              </a:rPr>
-              <a:t> Assess the skills and expertise needed for each role and evaluate whether you have the necessary talent for example:</a:t>
-            </a:r>
-            <a:r>
-              <a:rPr lang="en-IN" dirty="0">
-                <a:ea typeface="+mn-lt"/>
-                <a:cs typeface="+mn-lt"/>
-              </a:rPr>
-              <a:t> </a:t>
-            </a:r>
-          </a:p>
-          <a:p>
-            <a:pPr marL="0" indent="0">
-              <a:buNone/>
-            </a:pPr>
-            <a:r>
-              <a:rPr lang="en-IN" sz="2400" b="1" dirty="0">
-                <a:ea typeface="+mn-lt"/>
-                <a:cs typeface="+mn-lt"/>
-              </a:rPr>
-              <a:t>        1)  </a:t>
-            </a:r>
-            <a:r>
-              <a:rPr lang="en-IN" sz="2400" b="1" u="sng" dirty="0">
-                <a:ea typeface="+mn-lt"/>
-                <a:cs typeface="+mn-lt"/>
-              </a:rPr>
-              <a:t>Front-End Developer</a:t>
-            </a:r>
-            <a:r>
-              <a:rPr lang="en-IN" sz="2400" b="1" dirty="0">
-                <a:ea typeface="+mn-lt"/>
-                <a:cs typeface="+mn-lt"/>
-              </a:rPr>
-              <a:t>:</a:t>
-            </a:r>
-            <a:r>
-              <a:rPr lang="en-IN" sz="2400" dirty="0">
-                <a:ea typeface="+mn-lt"/>
-                <a:cs typeface="+mn-lt"/>
-              </a:rPr>
-              <a:t> To convert the design into a functional web page with HTML, CSS,                 and JavaScript.</a:t>
-            </a:r>
-            <a:endParaRPr lang="en-IN" dirty="0">
-              <a:ea typeface="+mn-lt"/>
-              <a:cs typeface="+mn-lt"/>
-            </a:endParaRPr>
-          </a:p>
-          <a:p>
-            <a:pPr marL="0" indent="0">
-              <a:buNone/>
-            </a:pPr>
-            <a:r>
-              <a:rPr lang="en-IN" sz="2400" b="1" dirty="0">
-                <a:ea typeface="+mn-lt"/>
-                <a:cs typeface="+mn-lt"/>
-              </a:rPr>
-              <a:t>         2)  </a:t>
-            </a:r>
-            <a:r>
-              <a:rPr lang="en-IN" sz="2400" b="1" u="sng" dirty="0">
-                <a:ea typeface="+mn-lt"/>
-                <a:cs typeface="+mn-lt"/>
-              </a:rPr>
-              <a:t>Back-End Developer</a:t>
-            </a:r>
-            <a:r>
-              <a:rPr lang="en-IN" sz="2400" b="1" dirty="0">
-                <a:ea typeface="+mn-lt"/>
-                <a:cs typeface="+mn-lt"/>
-              </a:rPr>
-              <a:t>:</a:t>
-            </a:r>
-            <a:r>
-              <a:rPr lang="en-IN" sz="2400" dirty="0">
-                <a:ea typeface="+mn-lt"/>
-                <a:cs typeface="+mn-lt"/>
-              </a:rPr>
-              <a:t> To handle server-side functionality, user authentication, and                              database integration.</a:t>
-            </a:r>
-            <a:endParaRPr lang="en-IN" dirty="0">
-              <a:ea typeface="+mn-lt"/>
-              <a:cs typeface="+mn-lt"/>
-            </a:endParaRPr>
-          </a:p>
-          <a:p>
-            <a:pPr marL="457200" indent="-457200"/>
-            <a:r>
-              <a:rPr lang="en-IN" sz="2400" b="1" u="sng" dirty="0">
-                <a:ea typeface="+mn-lt"/>
-                <a:cs typeface="+mn-lt"/>
-              </a:rPr>
-              <a:t>Resource Allocation</a:t>
-            </a:r>
-            <a:r>
-              <a:rPr lang="en-IN" sz="2400" b="1" dirty="0">
-                <a:ea typeface="+mn-lt"/>
-                <a:cs typeface="+mn-lt"/>
-              </a:rPr>
-              <a:t>:</a:t>
-            </a:r>
-            <a:r>
-              <a:rPr lang="en-IN" sz="2400" dirty="0">
-                <a:ea typeface="+mn-lt"/>
-                <a:cs typeface="+mn-lt"/>
-              </a:rPr>
-              <a:t> Allocate human resources effectively to meet development timelines and project milestones.</a:t>
-            </a:r>
-            <a:endParaRPr lang="en-IN" sz="2400">
-              <a:ea typeface="Calibri"/>
-              <a:cs typeface="Calibri"/>
-            </a:endParaRPr>
-          </a:p>
-          <a:p>
-            <a:pPr marL="0" indent="0">
-              <a:buNone/>
-            </a:pPr>
-            <a:endParaRPr lang="en-IN" sz="2400" b="1" u="sng" dirty="0">
+            <a:endParaRPr lang="en-IN" sz="2900" b="1" u="sng">
               <a:latin typeface="calibri light"/>
               <a:ea typeface="+mn-lt"/>
               <a:cs typeface="calibri light"/>
@@ -5125,9 +5461,8 @@
             <a:pPr marL="0" indent="0">
               <a:buNone/>
             </a:pPr>
-            <a:endParaRPr lang="en-IN" sz="2400" dirty="0">
+            <a:endParaRPr lang="en-IN">
               <a:latin typeface="calibri light"/>
-              <a:ea typeface="calibri light"/>
               <a:cs typeface="Calibri"/>
             </a:endParaRPr>
           </a:p>
@@ -5136,7 +5471,7 @@
     </p:spTree>
     <p:extLst>
       <p:ext uri="{BB962C8B-B14F-4D97-AF65-F5344CB8AC3E}">
-        <p14:creationId xmlns:p14="http://schemas.microsoft.com/office/powerpoint/2010/main" val="2289503668"/>
+        <p14:creationId xmlns:p14="http://schemas.microsoft.com/office/powerpoint/2010/main" val="2767332515"/>
       </p:ext>
     </p:extLst>
   </p:cSld>
@@ -5165,274 +5500,233 @@
       </p:grpSpPr>
       <p:sp>
         <p:nvSpPr>
-          <p:cNvPr id="3" name="Content Placeholder 2">
-            <a:extLst>
-              <a:ext uri="{FF2B5EF4-FFF2-40B4-BE49-F238E27FC236}">
-                <a16:creationId xmlns:a16="http://schemas.microsoft.com/office/drawing/2014/main" id="{1A7ED7D1-5048-498B-B092-E807E58A1614}"/>
-              </a:ext>
-            </a:extLst>
-          </p:cNvPr>
-          <p:cNvSpPr>
-            <a:spLocks noGrp="1"/>
-          </p:cNvSpPr>
-          <p:nvPr>
-            <p:ph idx="1"/>
+          <p:cNvPr id="2" name="Title 1">
+            <a:extLst>
+              <a:ext uri="{FF2B5EF4-FFF2-40B4-BE49-F238E27FC236}">
+                <a16:creationId xmlns:a16="http://schemas.microsoft.com/office/drawing/2014/main" id="{A66A6873-B83E-7743-AF3E-CD9AFC804CCB}"/>
+              </a:ext>
+            </a:extLst>
+          </p:cNvPr>
+          <p:cNvSpPr>
+            <a:spLocks noGrp="1"/>
+          </p:cNvSpPr>
+          <p:nvPr>
+            <p:ph type="title"/>
           </p:nvPr>
         </p:nvSpPr>
         <p:spPr>
           <a:xfrm>
-            <a:off x="3843" y="2647"/>
-            <a:ext cx="12227244" cy="6856626"/>
+            <a:off x="838200" y="365125"/>
+            <a:ext cx="10515600" cy="280886"/>
           </a:xfrm>
         </p:spPr>
         <p:txBody>
-          <a:bodyPr vert="horz" lIns="91440" tIns="45720" rIns="91440" bIns="45720" rtlCol="0" anchor="t">
-            <a:noAutofit/>
+          <a:bodyPr>
+            <a:normAutofit fontScale="90000"/>
           </a:bodyPr>
           <a:lstStyle/>
           <a:p>
-            <a:pPr marL="514350" indent="-514350">
-              <a:buFont typeface="Wingdings" panose="020B0604020202020204" pitchFamily="34" charset="0"/>
-              <a:buChar char="v"/>
-            </a:pPr>
-            <a:r>
-              <a:rPr lang="en-IN" sz="2900" b="1" u="sng" dirty="0">
-                <a:ea typeface="+mn-lt"/>
-                <a:cs typeface="+mn-lt"/>
-              </a:rPr>
-              <a:t>Financial Analysis</a:t>
-            </a:r>
-            <a:r>
-              <a:rPr lang="en-IN" sz="2900" b="1" dirty="0">
-                <a:ea typeface="+mn-lt"/>
-                <a:cs typeface="+mn-lt"/>
-              </a:rPr>
-              <a:t>:</a:t>
-            </a:r>
-            <a:endParaRPr lang="en-US" sz="2900" dirty="0">
+            <a:pPr algn="ctr"/>
+            <a:r>
+              <a:rPr lang="en-US" b="1" u="sng">
+                <a:ea typeface="Calibri Light"/>
+                <a:cs typeface="Calibri Light"/>
+              </a:rPr>
+              <a:t>CHATTING MODULE</a:t>
+            </a:r>
+          </a:p>
+        </p:txBody>
+      </p:sp>
+      <p:sp>
+        <p:nvSpPr>
+          <p:cNvPr id="3" name="Content Placeholder 2">
+            <a:extLst>
+              <a:ext uri="{FF2B5EF4-FFF2-40B4-BE49-F238E27FC236}">
+                <a16:creationId xmlns:a16="http://schemas.microsoft.com/office/drawing/2014/main" id="{1A2E5346-FA6F-E3BC-6266-358CA077EB10}"/>
+              </a:ext>
+            </a:extLst>
+          </p:cNvPr>
+          <p:cNvSpPr>
+            <a:spLocks noGrp="1"/>
+          </p:cNvSpPr>
+          <p:nvPr>
+            <p:ph idx="1"/>
+          </p:nvPr>
+        </p:nvSpPr>
+        <p:spPr>
+          <a:xfrm>
+            <a:off x="63911" y="854691"/>
+            <a:ext cx="12187082" cy="5998240"/>
+          </a:xfrm>
+        </p:spPr>
+        <p:txBody>
+          <a:bodyPr vert="horz" lIns="91440" tIns="45720" rIns="91440" bIns="45720" rtlCol="0" anchor="t">
+            <a:normAutofit lnSpcReduction="10000"/>
+          </a:bodyPr>
+          <a:lstStyle/>
+          <a:p>
+            <a:r>
+              <a:rPr lang="en-US" sz="2400" b="1" u="sng">
+                <a:ea typeface="+mn-lt"/>
+                <a:cs typeface="+mn-lt"/>
+              </a:rPr>
+              <a:t>Demand Analysis:</a:t>
+            </a:r>
+            <a:endParaRPr lang="en-US" sz="2400" b="1" u="sng">
               <a:ea typeface="Calibri"/>
               <a:cs typeface="Calibri"/>
             </a:endParaRPr>
           </a:p>
           <a:p>
-            <a:pPr marL="971550" lvl="1" indent="-285750">
-              <a:buFont typeface="Arial"/>
-              <a:buChar char="•"/>
-            </a:pPr>
-            <a:r>
-              <a:rPr lang="en-IN" sz="2900" b="1" u="sng" dirty="0">
-                <a:ea typeface="+mn-lt"/>
-                <a:cs typeface="+mn-lt"/>
-              </a:rPr>
-              <a:t>Cost Estimation</a:t>
-            </a:r>
-            <a:r>
-              <a:rPr lang="en-IN" sz="2900" b="1" dirty="0">
-                <a:ea typeface="+mn-lt"/>
-                <a:cs typeface="+mn-lt"/>
-              </a:rPr>
-              <a:t>:</a:t>
-            </a:r>
-            <a:r>
-              <a:rPr lang="en-IN" sz="2900" dirty="0">
-                <a:ea typeface="+mn-lt"/>
-                <a:cs typeface="+mn-lt"/>
-              </a:rPr>
-              <a:t> Estimate the initial and ongoing costs, including development, hosting, marketing, and administrative expenses.</a:t>
-            </a:r>
-            <a:endParaRPr lang="en-IN" sz="2900">
+            <a:r>
+              <a:rPr lang="en-US" sz="2000">
+                <a:ea typeface="+mn-lt"/>
+                <a:cs typeface="+mn-lt"/>
+              </a:rPr>
+              <a:t>Identify the target audience for the chatting module (e.g. hostel students and further more major Pg students on expansion).</a:t>
+            </a:r>
+            <a:endParaRPr lang="en-US" sz="2000">
               <a:ea typeface="Calibri"/>
               <a:cs typeface="Calibri"/>
             </a:endParaRPr>
           </a:p>
           <a:p>
-            <a:pPr marL="971550" lvl="1" indent="-285750">
-              <a:buFont typeface="Arial"/>
-              <a:buChar char="•"/>
-            </a:pPr>
-            <a:r>
-              <a:rPr lang="en-IN" sz="2900" b="1" u="sng" dirty="0">
-                <a:ea typeface="+mn-lt"/>
-                <a:cs typeface="+mn-lt"/>
-              </a:rPr>
-              <a:t>Revenue Projections</a:t>
-            </a:r>
-            <a:r>
-              <a:rPr lang="en-IN" sz="2900" b="1" dirty="0">
-                <a:ea typeface="+mn-lt"/>
-                <a:cs typeface="+mn-lt"/>
-              </a:rPr>
-              <a:t>:</a:t>
-            </a:r>
-            <a:r>
-              <a:rPr lang="en-IN" sz="2900" dirty="0">
-                <a:ea typeface="+mn-lt"/>
-                <a:cs typeface="+mn-lt"/>
-              </a:rPr>
-              <a:t> Create revenue models based on subscription fees, advertising, premium features, or any other monetization strategy.</a:t>
-            </a:r>
-            <a:endParaRPr lang="en-IN" sz="2900">
+            <a:r>
+              <a:rPr lang="en-US" sz="2000">
+                <a:ea typeface="+mn-lt"/>
+                <a:cs typeface="+mn-lt"/>
+              </a:rPr>
+              <a:t>Determine the expected demand for the chatting module based on market research, user surveys, and competitor analysis.</a:t>
+            </a:r>
+            <a:endParaRPr lang="en-US" sz="2000">
               <a:ea typeface="Calibri"/>
               <a:cs typeface="Calibri"/>
             </a:endParaRPr>
           </a:p>
           <a:p>
-            <a:pPr marL="971550" lvl="1" indent="-285750">
-              <a:buFont typeface="Arial"/>
-              <a:buChar char="•"/>
-            </a:pPr>
-            <a:r>
-              <a:rPr lang="en-IN" sz="2900" b="1" u="sng" dirty="0">
-                <a:ea typeface="+mn-lt"/>
-                <a:cs typeface="+mn-lt"/>
-              </a:rPr>
-              <a:t>Break-even Analysis</a:t>
-            </a:r>
-            <a:r>
-              <a:rPr lang="en-IN" sz="2900" b="1" dirty="0">
-                <a:ea typeface="+mn-lt"/>
-                <a:cs typeface="+mn-lt"/>
-              </a:rPr>
-              <a:t>:</a:t>
-            </a:r>
-            <a:r>
-              <a:rPr lang="en-IN" sz="2900" dirty="0">
-                <a:ea typeface="+mn-lt"/>
-                <a:cs typeface="+mn-lt"/>
-              </a:rPr>
-              <a:t> Determine the point at which the website will cover its costs and begin generating profits.</a:t>
-            </a:r>
-            <a:endParaRPr lang="en-IN" sz="2900">
+            <a:r>
+              <a:rPr lang="en-US" sz="2000">
+                <a:ea typeface="+mn-lt"/>
+                <a:cs typeface="+mn-lt"/>
+              </a:rPr>
+              <a:t>Analyze the potential user base and their specific needs and preferences for a seamless chatting experience.</a:t>
+            </a:r>
+            <a:endParaRPr lang="en-US" sz="2000">
               <a:ea typeface="Calibri"/>
               <a:cs typeface="Calibri"/>
             </a:endParaRPr>
           </a:p>
           <a:p>
-            <a:pPr marL="457200" indent="-457200">
-              <a:buFont typeface="Wingdings"/>
-              <a:buChar char="v"/>
-            </a:pPr>
-            <a:r>
-              <a:rPr lang="en-IN" sz="2900" b="1" dirty="0">
-                <a:ea typeface="+mn-lt"/>
-                <a:cs typeface="+mn-lt"/>
-              </a:rPr>
-              <a:t>Requirement Analysis:</a:t>
-            </a:r>
-            <a:endParaRPr lang="en-IN" sz="2900">
+            <a:r>
+              <a:rPr lang="en-US" sz="2400" b="1" u="sng">
+                <a:ea typeface="+mn-lt"/>
+                <a:cs typeface="+mn-lt"/>
+              </a:rPr>
+              <a:t>Feasibility Analysis:</a:t>
+            </a:r>
+            <a:endParaRPr lang="en-US" sz="2400" b="1" u="sng">
               <a:ea typeface="Calibri"/>
               <a:cs typeface="Calibri"/>
             </a:endParaRPr>
           </a:p>
           <a:p>
-            <a:pPr marL="971550" lvl="1" indent="-285750">
-              <a:buFont typeface="Arial"/>
-              <a:buChar char="•"/>
-            </a:pPr>
-            <a:r>
-              <a:rPr lang="en-IN" sz="2900" b="1" u="sng" dirty="0">
-                <a:ea typeface="+mn-lt"/>
-                <a:cs typeface="+mn-lt"/>
-              </a:rPr>
-              <a:t>User Stories</a:t>
-            </a:r>
-            <a:r>
-              <a:rPr lang="en-IN" sz="2900" b="1" dirty="0">
-                <a:ea typeface="+mn-lt"/>
-                <a:cs typeface="+mn-lt"/>
-              </a:rPr>
-              <a:t>:</a:t>
-            </a:r>
-            <a:r>
-              <a:rPr lang="en-IN" sz="2900" dirty="0">
-                <a:ea typeface="+mn-lt"/>
-                <a:cs typeface="+mn-lt"/>
-              </a:rPr>
-              <a:t> Create user stories and use cases to define the functionality and features required on the home page and throughout the website.</a:t>
-            </a:r>
-            <a:endParaRPr lang="en-IN" sz="2900">
+            <a:r>
+              <a:rPr lang="en-US" sz="2000">
+                <a:ea typeface="+mn-lt"/>
+                <a:cs typeface="+mn-lt"/>
+              </a:rPr>
+              <a:t>Evaluate the technical feasibility of developing the chatting module within the desired timeline and available resources.</a:t>
+            </a:r>
+            <a:endParaRPr lang="en-US" sz="2000">
               <a:ea typeface="Calibri"/>
               <a:cs typeface="Calibri"/>
             </a:endParaRPr>
           </a:p>
           <a:p>
-            <a:pPr marL="971550" lvl="1" indent="-285750">
-              <a:buFont typeface="Arial"/>
-              <a:buChar char="•"/>
-            </a:pPr>
-            <a:r>
-              <a:rPr lang="en-IN" sz="2900" b="1" u="sng" dirty="0">
-                <a:ea typeface="+mn-lt"/>
-                <a:cs typeface="+mn-lt"/>
-              </a:rPr>
-              <a:t>Feature Prioritization</a:t>
-            </a:r>
-            <a:r>
-              <a:rPr lang="en-IN" sz="2900" b="1" dirty="0">
-                <a:ea typeface="+mn-lt"/>
-                <a:cs typeface="+mn-lt"/>
-              </a:rPr>
-              <a:t>:</a:t>
-            </a:r>
-            <a:r>
-              <a:rPr lang="en-IN" sz="2900" dirty="0">
-                <a:ea typeface="+mn-lt"/>
-                <a:cs typeface="+mn-lt"/>
-              </a:rPr>
-              <a:t> Prioritize features based on user needs, business goals, and development resources.</a:t>
-            </a:r>
-            <a:endParaRPr lang="en-IN" sz="2900">
+            <a:r>
+              <a:rPr lang="en-US" sz="2000">
+                <a:ea typeface="+mn-lt"/>
+                <a:cs typeface="+mn-lt"/>
+              </a:rPr>
+              <a:t>Assess the feasibility of integrating the module with existing platforms or systems.</a:t>
+            </a:r>
+            <a:endParaRPr lang="en-US" sz="2000">
               <a:ea typeface="Calibri"/>
               <a:cs typeface="Calibri"/>
             </a:endParaRPr>
           </a:p>
           <a:p>
-            <a:pPr marL="971550" lvl="1" indent="-285750">
-              <a:buFont typeface="Arial"/>
-              <a:buChar char="•"/>
-            </a:pPr>
-            <a:r>
-              <a:rPr lang="en-IN" sz="2900" b="1" u="sng" dirty="0">
-                <a:ea typeface="+mn-lt"/>
-                <a:cs typeface="+mn-lt"/>
-              </a:rPr>
-              <a:t>Content Requirements</a:t>
-            </a:r>
-            <a:r>
-              <a:rPr lang="en-IN" sz="2900" b="1" dirty="0">
-                <a:ea typeface="+mn-lt"/>
-                <a:cs typeface="+mn-lt"/>
-              </a:rPr>
-              <a:t>:</a:t>
-            </a:r>
-            <a:r>
-              <a:rPr lang="en-IN" sz="2900" dirty="0">
-                <a:ea typeface="+mn-lt"/>
-                <a:cs typeface="+mn-lt"/>
-              </a:rPr>
-              <a:t> Identify the content elements such as text, images, videos, and user-generated content necessary for the home page.</a:t>
-            </a:r>
-            <a:endParaRPr lang="en-IN" sz="2900">
+            <a:r>
+              <a:rPr lang="en-US" sz="2000">
+                <a:ea typeface="+mn-lt"/>
+                <a:cs typeface="+mn-lt"/>
+              </a:rPr>
+              <a:t>Consider the feasibility of complying with data protection and privacy regulations.</a:t>
+            </a:r>
+            <a:endParaRPr lang="en-US" sz="2000">
               <a:ea typeface="Calibri"/>
               <a:cs typeface="Calibri"/>
             </a:endParaRPr>
           </a:p>
           <a:p>
-            <a:pPr marL="0" indent="0">
-              <a:buNone/>
-            </a:pPr>
-            <a:endParaRPr lang="en-IN" sz="2900" b="1" u="sng" dirty="0">
-              <a:latin typeface="calibri light"/>
-              <a:ea typeface="+mn-lt"/>
-              <a:cs typeface="calibri light"/>
-            </a:endParaRPr>
-          </a:p>
-          <a:p>
-            <a:pPr marL="0" indent="0">
-              <a:buNone/>
-            </a:pPr>
-            <a:endParaRPr lang="en-IN">
-              <a:latin typeface="calibri light"/>
+            <a:r>
+              <a:rPr lang="en-US" sz="2400" b="1" u="sng">
+                <a:ea typeface="+mn-lt"/>
+                <a:cs typeface="+mn-lt"/>
+              </a:rPr>
+              <a:t>Technical Analysis</a:t>
+            </a:r>
+            <a:r>
+              <a:rPr lang="en-US" sz="2400" b="1">
+                <a:ea typeface="+mn-lt"/>
+                <a:cs typeface="+mn-lt"/>
+              </a:rPr>
+              <a:t>:</a:t>
+            </a:r>
+            <a:endParaRPr lang="en-US" sz="2400" b="1">
+              <a:ea typeface="Calibri"/>
+              <a:cs typeface="Calibri"/>
+            </a:endParaRPr>
+          </a:p>
+          <a:p>
+            <a:r>
+              <a:rPr lang="en-US" sz="2000">
+                <a:ea typeface="+mn-lt"/>
+                <a:cs typeface="+mn-lt"/>
+              </a:rPr>
+              <a:t>Identify the required technical components for the chatting module, such as a server-side architecture, database management system, and client-side interfaces.</a:t>
+            </a:r>
+            <a:endParaRPr lang="en-US" sz="2000">
+              <a:ea typeface="Calibri"/>
+              <a:cs typeface="Calibri"/>
+            </a:endParaRPr>
+          </a:p>
+          <a:p>
+            <a:r>
+              <a:rPr lang="en-US" sz="2000">
+                <a:ea typeface="+mn-lt"/>
+                <a:cs typeface="+mn-lt"/>
+              </a:rPr>
+              <a:t>Evaluate the compatibility of the chosen technologies with the target platforms (e.g., web).</a:t>
+            </a:r>
+            <a:endParaRPr lang="en-US" sz="2000">
+              <a:ea typeface="Calibri"/>
+              <a:cs typeface="Calibri"/>
+            </a:endParaRPr>
+          </a:p>
+          <a:p>
+            <a:r>
+              <a:rPr lang="en-US" sz="2000">
+                <a:ea typeface="+mn-lt"/>
+                <a:cs typeface="+mn-lt"/>
+              </a:rPr>
+              <a:t>Assess the scalability, performance, and security aspects of the technical implementation.</a:t>
+            </a:r>
+            <a:br>
+              <a:rPr lang="en-US"/>
+            </a:br>
+            <a:endParaRPr lang="en-US">
+              <a:ea typeface="Calibri"/>
               <a:cs typeface="Calibri"/>
             </a:endParaRPr>
           </a:p>
@@ -5441,7 +5735,311 @@
     </p:spTree>
     <p:extLst>
       <p:ext uri="{BB962C8B-B14F-4D97-AF65-F5344CB8AC3E}">
-        <p14:creationId xmlns:p14="http://schemas.microsoft.com/office/powerpoint/2010/main" val="2767332515"/>
+        <p14:creationId xmlns:p14="http://schemas.microsoft.com/office/powerpoint/2010/main" val="2779233696"/>
+      </p:ext>
+    </p:extLst>
+  </p:cSld>
+  <p:clrMapOvr>
+    <a:masterClrMapping/>
+  </p:clrMapOvr>
+</p:sld>
+</file>
+
+<file path=ppt/slides/slide15.xml><?xml version="1.0" encoding="utf-8"?>
+<p:sld xmlns:a="http://schemas.openxmlformats.org/drawingml/2006/main" xmlns:r="http://schemas.openxmlformats.org/officeDocument/2006/relationships" xmlns:p="http://schemas.openxmlformats.org/presentationml/2006/main">
+  <p:cSld>
+    <p:spTree>
+      <p:nvGrpSpPr>
+        <p:cNvPr id="1" name=""/>
+        <p:cNvGrpSpPr/>
+        <p:nvPr/>
+      </p:nvGrpSpPr>
+      <p:grpSpPr>
+        <a:xfrm>
+          <a:off x="0" y="0"/>
+          <a:ext cx="0" cy="0"/>
+          <a:chOff x="0" y="0"/>
+          <a:chExt cx="0" cy="0"/>
+        </a:xfrm>
+      </p:grpSpPr>
+      <p:sp>
+        <p:nvSpPr>
+          <p:cNvPr id="2" name="Title 1">
+            <a:extLst>
+              <a:ext uri="{FF2B5EF4-FFF2-40B4-BE49-F238E27FC236}">
+                <a16:creationId xmlns:a16="http://schemas.microsoft.com/office/drawing/2014/main" id="{B2CB9EC4-B9EC-B548-F6E3-CB6D8011B946}"/>
+              </a:ext>
+            </a:extLst>
+          </p:cNvPr>
+          <p:cNvSpPr>
+            <a:spLocks noGrp="1"/>
+          </p:cNvSpPr>
+          <p:nvPr>
+            <p:ph type="title"/>
+          </p:nvPr>
+        </p:nvSpPr>
+        <p:spPr>
+          <a:xfrm flipH="1" flipV="1">
+            <a:off x="-1710812" y="-398667"/>
+            <a:ext cx="693174" cy="763792"/>
+          </a:xfrm>
+        </p:spPr>
+        <p:txBody>
+          <a:bodyPr/>
+          <a:lstStyle/>
+          <a:p>
+            <a:endParaRPr lang="en-US"/>
+          </a:p>
+        </p:txBody>
+      </p:sp>
+      <p:sp>
+        <p:nvSpPr>
+          <p:cNvPr id="3" name="Content Placeholder 2">
+            <a:extLst>
+              <a:ext uri="{FF2B5EF4-FFF2-40B4-BE49-F238E27FC236}">
+                <a16:creationId xmlns:a16="http://schemas.microsoft.com/office/drawing/2014/main" id="{7E6C4B12-B282-2E7A-E04A-A03510DC4CA6}"/>
+              </a:ext>
+            </a:extLst>
+          </p:cNvPr>
+          <p:cNvSpPr>
+            <a:spLocks noGrp="1"/>
+          </p:cNvSpPr>
+          <p:nvPr>
+            <p:ph idx="1"/>
+          </p:nvPr>
+        </p:nvSpPr>
+        <p:spPr>
+          <a:xfrm>
+            <a:off x="2459" y="80401"/>
+            <a:ext cx="12088758" cy="6784820"/>
+          </a:xfrm>
+        </p:spPr>
+        <p:txBody>
+          <a:bodyPr vert="horz" lIns="91440" tIns="45720" rIns="91440" bIns="45720" rtlCol="0" anchor="t">
+            <a:normAutofit fontScale="85000" lnSpcReduction="20000"/>
+          </a:bodyPr>
+          <a:lstStyle/>
+          <a:p>
+            <a:r>
+              <a:rPr lang="en-US" b="1" u="sng">
+                <a:ea typeface="+mn-lt"/>
+                <a:cs typeface="+mn-lt"/>
+              </a:rPr>
+              <a:t>Manpower Analysis:</a:t>
+            </a:r>
+            <a:endParaRPr lang="en-US" b="1" u="sng">
+              <a:ea typeface="Calibri" panose="020F0502020204030204"/>
+              <a:cs typeface="Calibri" panose="020F0502020204030204"/>
+            </a:endParaRPr>
+          </a:p>
+          <a:p>
+            <a:r>
+              <a:rPr lang="en-US" sz="2400">
+                <a:ea typeface="+mn-lt"/>
+                <a:cs typeface="+mn-lt"/>
+              </a:rPr>
+              <a:t>Determine the skill sets required for developing and maintaining the chatting module (e.g., software development, database management, user interface design).</a:t>
+            </a:r>
+            <a:endParaRPr lang="en-US" sz="2400">
+              <a:ea typeface="Calibri"/>
+              <a:cs typeface="Calibri"/>
+            </a:endParaRPr>
+          </a:p>
+          <a:p>
+            <a:r>
+              <a:rPr lang="en-US" sz="2400">
+                <a:ea typeface="+mn-lt"/>
+                <a:cs typeface="+mn-lt"/>
+              </a:rPr>
+              <a:t>Assess the availability of resources within the organization.</a:t>
+            </a:r>
+            <a:endParaRPr lang="en-US" sz="2400">
+              <a:ea typeface="Calibri"/>
+              <a:cs typeface="Calibri"/>
+            </a:endParaRPr>
+          </a:p>
+          <a:p>
+            <a:r>
+              <a:rPr lang="en-US" sz="2400">
+                <a:ea typeface="+mn-lt"/>
+                <a:cs typeface="+mn-lt"/>
+              </a:rPr>
+              <a:t>Evaluate the workload distribution and define roles and responsibilities for efficient project management.</a:t>
+            </a:r>
+            <a:endParaRPr lang="en-US" sz="2400">
+              <a:ea typeface="Calibri"/>
+              <a:cs typeface="Calibri"/>
+            </a:endParaRPr>
+          </a:p>
+          <a:p>
+            <a:r>
+              <a:rPr lang="en-US" b="1" u="sng">
+                <a:ea typeface="+mn-lt"/>
+                <a:cs typeface="+mn-lt"/>
+              </a:rPr>
+              <a:t>Financial Analysis:</a:t>
+            </a:r>
+            <a:endParaRPr lang="en-US" b="1" u="sng">
+              <a:ea typeface="Calibri"/>
+              <a:cs typeface="Calibri"/>
+            </a:endParaRPr>
+          </a:p>
+          <a:p>
+            <a:r>
+              <a:rPr lang="en-US">
+                <a:ea typeface="+mn-lt"/>
+                <a:cs typeface="+mn-lt"/>
+              </a:rPr>
+              <a:t>Estimate the development and maintenance costs associated with the chatting module, including software licenses, infrastructure, and ongoing support.</a:t>
+            </a:r>
+            <a:endParaRPr lang="en-US"/>
+          </a:p>
+          <a:p>
+            <a:r>
+              <a:rPr lang="en-US">
+                <a:ea typeface="+mn-lt"/>
+                <a:cs typeface="+mn-lt"/>
+              </a:rPr>
+              <a:t>Assess the potential revenue generation opportunities, such as in-app purchases, subscriptions, or advertisements.</a:t>
+            </a:r>
+            <a:endParaRPr lang="en-US"/>
+          </a:p>
+          <a:p>
+            <a:r>
+              <a:rPr lang="en-US">
+                <a:ea typeface="+mn-lt"/>
+                <a:cs typeface="+mn-lt"/>
+              </a:rPr>
+              <a:t>Conduct a cost-benefit analysis to determine the financial feasibility and profitability of the chatting module.</a:t>
+            </a:r>
+            <a:endParaRPr lang="en-US"/>
+          </a:p>
+          <a:p>
+            <a:r>
+              <a:rPr lang="en-US" b="1" u="sng">
+                <a:ea typeface="+mn-lt"/>
+                <a:cs typeface="+mn-lt"/>
+              </a:rPr>
+              <a:t>Requirement Analysis:</a:t>
+            </a:r>
+            <a:endParaRPr lang="en-US" b="1" u="sng"/>
+          </a:p>
+          <a:p>
+            <a:r>
+              <a:rPr lang="en-US">
+                <a:ea typeface="+mn-lt"/>
+                <a:cs typeface="+mn-lt"/>
+              </a:rPr>
+              <a:t>Define the functional requirements of the chatting module, including core features such as real-time messaging, user authentication, and message history.</a:t>
+            </a:r>
+            <a:endParaRPr lang="en-US"/>
+          </a:p>
+          <a:p>
+            <a:r>
+              <a:rPr lang="en-US">
+                <a:ea typeface="+mn-lt"/>
+                <a:cs typeface="+mn-lt"/>
+              </a:rPr>
+              <a:t>Identify any additional desired features, such as file sharing, group chats, or multimedia support.</a:t>
+            </a:r>
+            <a:endParaRPr lang="en-US"/>
+          </a:p>
+          <a:p>
+            <a:r>
+              <a:rPr lang="en-US">
+                <a:ea typeface="+mn-lt"/>
+                <a:cs typeface="+mn-lt"/>
+              </a:rPr>
+              <a:t>Analyze non-functional requirements, such as performance, security, and user interface design, to ensure a satisfying user experience.</a:t>
+            </a:r>
+            <a:endParaRPr lang="en-US"/>
+          </a:p>
+        </p:txBody>
+      </p:sp>
+    </p:spTree>
+    <p:extLst>
+      <p:ext uri="{BB962C8B-B14F-4D97-AF65-F5344CB8AC3E}">
+        <p14:creationId xmlns:p14="http://schemas.microsoft.com/office/powerpoint/2010/main" val="3571679"/>
+      </p:ext>
+    </p:extLst>
+  </p:cSld>
+  <p:clrMapOvr>
+    <a:masterClrMapping/>
+  </p:clrMapOvr>
+</p:sld>
+</file>
+
+<file path=ppt/slides/slide16.xml><?xml version="1.0" encoding="utf-8"?>
+<p:sld xmlns:a="http://schemas.openxmlformats.org/drawingml/2006/main" xmlns:r="http://schemas.openxmlformats.org/officeDocument/2006/relationships" xmlns:p="http://schemas.openxmlformats.org/presentationml/2006/main">
+  <p:cSld>
+    <p:spTree>
+      <p:nvGrpSpPr>
+        <p:cNvPr id="1" name=""/>
+        <p:cNvGrpSpPr/>
+        <p:nvPr/>
+      </p:nvGrpSpPr>
+      <p:grpSpPr>
+        <a:xfrm>
+          <a:off x="0" y="0"/>
+          <a:ext cx="0" cy="0"/>
+          <a:chOff x="0" y="0"/>
+          <a:chExt cx="0" cy="0"/>
+        </a:xfrm>
+      </p:grpSpPr>
+      <p:sp>
+        <p:nvSpPr>
+          <p:cNvPr id="2" name="Title 1">
+            <a:extLst>
+              <a:ext uri="{FF2B5EF4-FFF2-40B4-BE49-F238E27FC236}">
+                <a16:creationId xmlns:a16="http://schemas.microsoft.com/office/drawing/2014/main" id="{5051F7C7-EDD8-B2EF-AC4F-CBD731C5FEAF}"/>
+              </a:ext>
+            </a:extLst>
+          </p:cNvPr>
+          <p:cNvSpPr>
+            <a:spLocks noGrp="1"/>
+          </p:cNvSpPr>
+          <p:nvPr>
+            <p:ph type="title"/>
+          </p:nvPr>
+        </p:nvSpPr>
+        <p:spPr/>
+        <p:txBody>
+          <a:bodyPr/>
+          <a:lstStyle/>
+          <a:p>
+            <a:endParaRPr lang="en-US"/>
+          </a:p>
+        </p:txBody>
+      </p:sp>
+      <p:sp>
+        <p:nvSpPr>
+          <p:cNvPr id="3" name="Content Placeholder 2">
+            <a:extLst>
+              <a:ext uri="{FF2B5EF4-FFF2-40B4-BE49-F238E27FC236}">
+                <a16:creationId xmlns:a16="http://schemas.microsoft.com/office/drawing/2014/main" id="{D89175D7-4439-199D-A235-12CBAB09E651}"/>
+              </a:ext>
+            </a:extLst>
+          </p:cNvPr>
+          <p:cNvSpPr>
+            <a:spLocks noGrp="1"/>
+          </p:cNvSpPr>
+          <p:nvPr>
+            <p:ph idx="1"/>
+          </p:nvPr>
+        </p:nvSpPr>
+        <p:spPr/>
+        <p:txBody>
+          <a:bodyPr/>
+          <a:lstStyle/>
+          <a:p>
+            <a:endParaRPr lang="en-US"/>
+          </a:p>
+        </p:txBody>
+      </p:sp>
+    </p:spTree>
+    <p:extLst>
+      <p:ext uri="{BB962C8B-B14F-4D97-AF65-F5344CB8AC3E}">
+        <p14:creationId xmlns:p14="http://schemas.microsoft.com/office/powerpoint/2010/main" val="1876807123"/>
       </p:ext>
     </p:extLst>
   </p:cSld>
@@ -5964,56 +6562,49 @@
           <a:lstStyle/>
           <a:p>
             <a:r>
-              <a:rPr lang="en-GB" dirty="0">
-                <a:latin typeface="calibri light"/>
-                <a:cs typeface="calibri light"/>
-              </a:rPr>
-              <a:t>Users can specify a wide range of criteria, such as cleanliness, noise tolerance, sleep schedule, smoking preferences, and pet-friendliness. This ensures that potential roommates align with their daily habits and preferences.</a:t>
-            </a:r>
-          </a:p>
-          <a:p>
-            <a:r>
-              <a:rPr lang="en-GB" dirty="0">
-                <a:latin typeface="calibri light"/>
-                <a:cs typeface="calibri light"/>
-              </a:rPr>
-              <a:t>Users can specify their desired living arrangements, such as location, apartment size. This helps in finding roommates who are on the same page regarding their future living situation.</a:t>
-            </a:r>
-          </a:p>
-          <a:p>
-            <a:r>
-              <a:rPr lang="en-GB" dirty="0">
-                <a:latin typeface="calibri light"/>
-                <a:cs typeface="calibri light"/>
-              </a:rPr>
-              <a:t>Users can set privacy preferences, controlling the level of information visible to potential roommates. This ensures a safe and secure environment for sharing personal details.</a:t>
-            </a:r>
-          </a:p>
-          <a:p>
-            <a:r>
-              <a:rPr lang="en-GB" dirty="0">
-                <a:latin typeface="calibri light"/>
-                <a:cs typeface="calibri light"/>
-              </a:rPr>
-              <a:t>The interface will be intuitive and user-friendly, making it easy for users to set up their preferences and navigate the system</a:t>
-            </a:r>
-          </a:p>
-          <a:p>
-            <a:r>
-              <a:rPr lang="en-GB" dirty="0">
-                <a:latin typeface="calibri light"/>
-                <a:cs typeface="calibri light"/>
-              </a:rPr>
-              <a:t>The frontend will use HTML, CSS, JS and the backend will use </a:t>
-            </a:r>
-            <a:r>
               <a:rPr lang="en-GB">
                 <a:latin typeface="calibri light"/>
                 <a:cs typeface="calibri light"/>
               </a:rPr>
-              <a:t>php</a:t>
-            </a:r>
-            <a:endParaRPr lang="en-IN" dirty="0">
+              <a:t>Users can specify a wide range of criteria, such as cleanliness, noise tolerance, sleep schedule, smoking preferences, and pet-friendliness. This ensures that potential roommates align with their daily habits and preferences.</a:t>
+            </a:r>
+          </a:p>
+          <a:p>
+            <a:r>
+              <a:rPr lang="en-GB">
+                <a:latin typeface="calibri light"/>
+                <a:cs typeface="calibri light"/>
+              </a:rPr>
+              <a:t>Users can specify their desired living arrangements, such as location, apartment size. This helps in finding roommates who are on the same page regarding their future living situation.</a:t>
+            </a:r>
+          </a:p>
+          <a:p>
+            <a:r>
+              <a:rPr lang="en-GB">
+                <a:latin typeface="calibri light"/>
+                <a:cs typeface="calibri light"/>
+              </a:rPr>
+              <a:t>Users can set privacy preferences, controlling the level of information visible to potential roommates. This ensures a safe and secure environment for sharing personal details.</a:t>
+            </a:r>
+          </a:p>
+          <a:p>
+            <a:r>
+              <a:rPr lang="en-GB">
+                <a:latin typeface="calibri light"/>
+                <a:cs typeface="calibri light"/>
+              </a:rPr>
+              <a:t>The interface will be intuitive and user-friendly, making it easy for users to set up their preferences and navigate the system</a:t>
+            </a:r>
+          </a:p>
+          <a:p>
+            <a:r>
+              <a:rPr lang="en-GB">
+                <a:latin typeface="calibri light"/>
+                <a:cs typeface="calibri light"/>
+              </a:rPr>
+              <a:t>The frontend will use HTML, CSS, JS and the backend will use php</a:t>
+            </a:r>
+            <a:endParaRPr lang="en-IN">
               <a:latin typeface="calibri light"/>
               <a:cs typeface="calibri light"/>
             </a:endParaRPr>
@@ -6680,35 +7271,214 @@
             <p:ph idx="1"/>
           </p:nvPr>
         </p:nvSpPr>
-        <p:spPr/>
+        <p:spPr>
+          <a:xfrm>
+            <a:off x="2459" y="1555238"/>
+            <a:ext cx="11928986" cy="5309983"/>
+          </a:xfrm>
+        </p:spPr>
         <p:txBody>
           <a:bodyPr vert="horz" lIns="91440" tIns="45720" rIns="91440" bIns="45720" rtlCol="0" anchor="t">
-            <a:normAutofit/>
+            <a:noAutofit/>
           </a:bodyPr>
           <a:lstStyle/>
           <a:p>
             <a:r>
-              <a:rPr lang="en-IN" dirty="0">
+              <a:rPr lang="en-IN" sz="2400">
                 <a:latin typeface="calibri light"/>
                 <a:cs typeface="calibri light"/>
               </a:rPr>
               <a:t>The "Chatting" module for our website "</a:t>
             </a:r>
             <a:r>
-              <a:rPr lang="en-IN" dirty="0" err="1">
+              <a:rPr lang="en-IN" sz="2400" err="1">
                 <a:latin typeface="calibri light"/>
                 <a:cs typeface="calibri light"/>
               </a:rPr>
               <a:t>RoomR</a:t>
             </a:r>
             <a:r>
-              <a:rPr lang="en-IN" dirty="0">
+              <a:rPr lang="en-IN" sz="2400">
                 <a:latin typeface="calibri light"/>
                 <a:cs typeface="calibri light"/>
               </a:rPr>
               <a:t>" serves as the Interaction page between users and provides a clear and engaging introduction to the platform's purpose and features. Here's a breakdown of what we'll include in this module:</a:t>
             </a:r>
-            <a:endParaRPr lang="en-IN" dirty="0"/>
+            <a:endParaRPr lang="en-IN" sz="2400">
+              <a:latin typeface="calibri light"/>
+              <a:ea typeface="calibri light"/>
+              <a:cs typeface="calibri light"/>
+            </a:endParaRPr>
+          </a:p>
+          <a:p>
+            <a:r>
+              <a:rPr lang="en-IN" sz="2400">
+                <a:latin typeface="calibri light"/>
+                <a:ea typeface="calibri light"/>
+                <a:cs typeface="calibri light"/>
+              </a:rPr>
+              <a:t>The module will connect users who have liked </a:t>
+            </a:r>
+            <a:r>
+              <a:rPr lang="en-IN" sz="2400" err="1">
+                <a:latin typeface="calibri light"/>
+                <a:ea typeface="calibri light"/>
+                <a:cs typeface="calibri light"/>
+              </a:rPr>
+              <a:t>each others</a:t>
+            </a:r>
+            <a:r>
+              <a:rPr lang="en-IN" sz="2400">
+                <a:latin typeface="calibri light"/>
+                <a:ea typeface="calibri light"/>
+                <a:cs typeface="calibri light"/>
+              </a:rPr>
+              <a:t> preferences and want to </a:t>
+            </a:r>
+            <a:r>
+              <a:rPr lang="en-IN" sz="2400" err="1">
+                <a:latin typeface="calibri light"/>
+                <a:ea typeface="calibri light"/>
+                <a:cs typeface="calibri light"/>
+              </a:rPr>
+              <a:t>furthere</a:t>
+            </a:r>
+            <a:r>
+              <a:rPr lang="en-IN" sz="2400">
+                <a:latin typeface="calibri light"/>
+                <a:ea typeface="calibri light"/>
+                <a:cs typeface="calibri light"/>
+              </a:rPr>
+              <a:t> communicate.</a:t>
+            </a:r>
+          </a:p>
+          <a:p>
+            <a:r>
+              <a:rPr lang="en-IN" sz="2400">
+                <a:latin typeface="calibri light"/>
+                <a:ea typeface="calibri light"/>
+                <a:cs typeface="calibri light"/>
+              </a:rPr>
+              <a:t>It will help users to interact with each other with features like real time chatting, notifications, message history along with media sharing and user authentication.</a:t>
+            </a:r>
+          </a:p>
+          <a:p>
+            <a:r>
+              <a:rPr lang="en-IN" sz="2400">
+                <a:latin typeface="calibri light"/>
+                <a:ea typeface="calibri light"/>
+                <a:cs typeface="calibri light"/>
+              </a:rPr>
+              <a:t>The module will be based on a peer to peer architecture hence no need for a central server is required.</a:t>
+            </a:r>
+          </a:p>
+          <a:p>
+            <a:r>
+              <a:rPr lang="en-IN" sz="2400">
+                <a:latin typeface="calibri light"/>
+                <a:ea typeface="calibri light"/>
+                <a:cs typeface="calibri light"/>
+              </a:rPr>
+              <a:t>Users will only be able to chat when they have liked each other hence maintaining privacy.</a:t>
+            </a:r>
+          </a:p>
+          <a:p>
+            <a:r>
+              <a:rPr lang="en-IN" sz="2400">
+                <a:latin typeface="calibri light"/>
+                <a:ea typeface="calibri light"/>
+                <a:cs typeface="calibri light"/>
+              </a:rPr>
+              <a:t>Messages will be </a:t>
+            </a:r>
+            <a:r>
+              <a:rPr lang="en-IN" sz="2400" err="1">
+                <a:latin typeface="calibri light"/>
+                <a:ea typeface="calibri light"/>
+                <a:cs typeface="calibri light"/>
+              </a:rPr>
+              <a:t>encrpyted</a:t>
+            </a:r>
+            <a:r>
+              <a:rPr lang="en-IN" sz="2400">
+                <a:latin typeface="calibri light"/>
+                <a:ea typeface="calibri light"/>
+                <a:cs typeface="calibri light"/>
+              </a:rPr>
+              <a:t> and can only </a:t>
+            </a:r>
+            <a:r>
+              <a:rPr lang="en-IN" sz="2400" err="1">
+                <a:latin typeface="calibri light"/>
+                <a:ea typeface="calibri light"/>
+                <a:cs typeface="calibri light"/>
+              </a:rPr>
+              <a:t>he</a:t>
+            </a:r>
+            <a:r>
+              <a:rPr lang="en-IN" sz="2400">
+                <a:latin typeface="calibri light"/>
+                <a:ea typeface="calibri light"/>
+                <a:cs typeface="calibri light"/>
+              </a:rPr>
+              <a:t> accessed by the users and the Admin</a:t>
+            </a:r>
+          </a:p>
+          <a:p>
+            <a:r>
+              <a:rPr lang="en-IN" sz="2400">
+                <a:latin typeface="calibri light"/>
+                <a:ea typeface="calibri light"/>
+                <a:cs typeface="calibri light"/>
+              </a:rPr>
+              <a:t>Chats can be reported </a:t>
+            </a:r>
+            <a:r>
+              <a:rPr lang="en-IN" sz="2400" err="1">
+                <a:latin typeface="calibri light"/>
+                <a:ea typeface="calibri light"/>
+                <a:cs typeface="calibri light"/>
+              </a:rPr>
+              <a:t>incase</a:t>
+            </a:r>
+            <a:r>
+              <a:rPr lang="en-IN" sz="2400">
+                <a:latin typeface="calibri light"/>
+                <a:ea typeface="calibri light"/>
+                <a:cs typeface="calibri light"/>
+              </a:rPr>
+              <a:t> of any misuse and will be looked into immediately to make sure </a:t>
+            </a:r>
+            <a:r>
+              <a:rPr lang="en-IN" sz="2400" err="1">
+                <a:latin typeface="calibri light"/>
+                <a:ea typeface="calibri light"/>
+                <a:cs typeface="calibri light"/>
+              </a:rPr>
+              <a:t>Roomr</a:t>
+            </a:r>
+            <a:r>
+              <a:rPr lang="en-IN" sz="2400">
+                <a:latin typeface="calibri light"/>
+                <a:ea typeface="calibri light"/>
+                <a:cs typeface="calibri light"/>
+              </a:rPr>
+              <a:t> remains user friendly</a:t>
+            </a:r>
+          </a:p>
+          <a:p>
+            <a:endParaRPr lang="en-IN">
+              <a:latin typeface="calibri light"/>
+              <a:ea typeface="calibri light"/>
+              <a:cs typeface="calibri light"/>
+            </a:endParaRPr>
+          </a:p>
+          <a:p>
+            <a:endParaRPr lang="en-IN">
+              <a:latin typeface="calibri light"/>
+              <a:ea typeface="calibri light"/>
+              <a:cs typeface="calibri light"/>
+            </a:endParaRPr>
           </a:p>
         </p:txBody>
       </p:sp>

</xml_diff>